<commit_message>
Implemented the first part of the results section
</commit_message>
<xml_diff>
--- a/Deliverables/Poster/CS229_FinalPoster.pptx
+++ b/Deliverables/Poster/CS229_FinalPoster.pptx
@@ -161,18 +161,18 @@
   <pc:docChgLst>
     <pc:chgData name="Lloyd Maza" userId="5cfd7a001bc0d1c4" providerId="LiveId" clId="{8A4B9DA1-AA44-4226-A7C5-62EEAB57F517}"/>
     <pc:docChg chg="undo custSel modSld">
-      <pc:chgData name="Lloyd Maza" userId="5cfd7a001bc0d1c4" providerId="LiveId" clId="{8A4B9DA1-AA44-4226-A7C5-62EEAB57F517}" dt="2017-12-10T20:24:10.009" v="751" actId="20577"/>
+      <pc:chgData name="Lloyd Maza" userId="5cfd7a001bc0d1c4" providerId="LiveId" clId="{8A4B9DA1-AA44-4226-A7C5-62EEAB57F517}" dt="2017-12-10T22:41:06.004" v="1303" actId="12788"/>
       <pc:docMkLst>
         <pc:docMk/>
       </pc:docMkLst>
       <pc:sldChg chg="addSp delSp modSp">
-        <pc:chgData name="Lloyd Maza" userId="5cfd7a001bc0d1c4" providerId="LiveId" clId="{8A4B9DA1-AA44-4226-A7C5-62EEAB57F517}" dt="2017-12-10T20:24:10.009" v="751" actId="20577"/>
+        <pc:chgData name="Lloyd Maza" userId="5cfd7a001bc0d1c4" providerId="LiveId" clId="{8A4B9DA1-AA44-4226-A7C5-62EEAB57F517}" dt="2017-12-10T22:41:06.004" v="1303" actId="12788"/>
         <pc:sldMkLst>
           <pc:docMk/>
           <pc:sldMk cId="0" sldId="256"/>
         </pc:sldMkLst>
         <pc:spChg chg="add mod">
-          <ac:chgData name="Lloyd Maza" userId="5cfd7a001bc0d1c4" providerId="LiveId" clId="{8A4B9DA1-AA44-4226-A7C5-62EEAB57F517}" dt="2017-12-10T20:24:10.009" v="751" actId="20577"/>
+          <ac:chgData name="Lloyd Maza" userId="5cfd7a001bc0d1c4" providerId="LiveId" clId="{8A4B9DA1-AA44-4226-A7C5-62EEAB57F517}" dt="2017-12-10T22:29:50.019" v="798" actId="1076"/>
           <ac:spMkLst>
             <pc:docMk/>
             <pc:sldMk cId="0" sldId="256"/>
@@ -291,6 +291,38 @@
             <ac:spMk id="58" creationId="{0CBA8E89-0D4F-4DA5-B707-CA12139F216F}"/>
           </ac:spMkLst>
         </pc:spChg>
+        <pc:spChg chg="add del">
+          <ac:chgData name="Lloyd Maza" userId="5cfd7a001bc0d1c4" providerId="LiveId" clId="{8A4B9DA1-AA44-4226-A7C5-62EEAB57F517}" dt="2017-12-10T22:29:50.441" v="799"/>
+          <ac:spMkLst>
+            <pc:docMk/>
+            <pc:sldMk cId="0" sldId="256"/>
+            <ac:spMk id="61" creationId="{4495FFC7-12A2-4779-94D8-198C8F4889A0}"/>
+          </ac:spMkLst>
+        </pc:spChg>
+        <pc:spChg chg="add mod">
+          <ac:chgData name="Lloyd Maza" userId="5cfd7a001bc0d1c4" providerId="LiveId" clId="{8A4B9DA1-AA44-4226-A7C5-62EEAB57F517}" dt="2017-12-10T22:32:20.944" v="949" actId="20577"/>
+          <ac:spMkLst>
+            <pc:docMk/>
+            <pc:sldMk cId="0" sldId="256"/>
+            <ac:spMk id="62" creationId="{9F7E9392-6A19-456C-8B8C-7B4C60077DF3}"/>
+          </ac:spMkLst>
+        </pc:spChg>
+        <pc:spChg chg="add mod">
+          <ac:chgData name="Lloyd Maza" userId="5cfd7a001bc0d1c4" providerId="LiveId" clId="{8A4B9DA1-AA44-4226-A7C5-62EEAB57F517}" dt="2017-12-10T22:41:06.004" v="1303" actId="12788"/>
+          <ac:spMkLst>
+            <pc:docMk/>
+            <pc:sldMk cId="0" sldId="256"/>
+            <ac:spMk id="63" creationId="{3B96B831-EAC2-4E77-B47E-DB3BDDD44C3C}"/>
+          </ac:spMkLst>
+        </pc:spChg>
+        <pc:spChg chg="add mod">
+          <ac:chgData name="Lloyd Maza" userId="5cfd7a001bc0d1c4" providerId="LiveId" clId="{8A4B9DA1-AA44-4226-A7C5-62EEAB57F517}" dt="2017-12-10T22:41:06.004" v="1303" actId="12788"/>
+          <ac:spMkLst>
+            <pc:docMk/>
+            <pc:sldMk cId="0" sldId="256"/>
+            <ac:spMk id="64" creationId="{7A35AC6A-B414-4A1C-8EC6-7565C63E20D2}"/>
+          </ac:spMkLst>
+        </pc:spChg>
         <pc:grpChg chg="add mod">
           <ac:chgData name="Lloyd Maza" userId="5cfd7a001bc0d1c4" providerId="LiveId" clId="{8A4B9DA1-AA44-4226-A7C5-62EEAB57F517}" dt="2017-12-10T19:42:30.006" v="600" actId="164"/>
           <ac:grpSpMkLst>
@@ -308,7 +340,7 @@
           </ac:grpSpMkLst>
         </pc:grpChg>
         <pc:grpChg chg="mod">
-          <ac:chgData name="Lloyd Maza" userId="5cfd7a001bc0d1c4" providerId="LiveId" clId="{8A4B9DA1-AA44-4226-A7C5-62EEAB57F517}" dt="2017-12-10T19:56:27.515" v="621" actId="1076"/>
+          <ac:chgData name="Lloyd Maza" userId="5cfd7a001bc0d1c4" providerId="LiveId" clId="{8A4B9DA1-AA44-4226-A7C5-62EEAB57F517}" dt="2017-12-10T22:29:17.488" v="779" actId="12789"/>
           <ac:grpSpMkLst>
             <pc:docMk/>
             <pc:sldMk cId="0" sldId="256"/>
@@ -331,12 +363,76 @@
             <ac:picMk id="16" creationId="{191C8303-B7F1-40A1-9441-34ECDA12F015}"/>
           </ac:picMkLst>
         </pc:picChg>
+        <pc:picChg chg="add del mod modCrop">
+          <ac:chgData name="Lloyd Maza" userId="5cfd7a001bc0d1c4" providerId="LiveId" clId="{8A4B9DA1-AA44-4226-A7C5-62EEAB57F517}" dt="2017-12-10T22:40:27.403" v="1300" actId="1038"/>
+          <ac:picMkLst>
+            <pc:docMk/>
+            <pc:sldMk cId="0" sldId="256"/>
+            <ac:picMk id="19" creationId="{BD827A07-8861-4ED7-94A6-4388C2461024}"/>
+          </ac:picMkLst>
+        </pc:picChg>
+        <pc:picChg chg="add mod modCrop">
+          <ac:chgData name="Lloyd Maza" userId="5cfd7a001bc0d1c4" providerId="LiveId" clId="{8A4B9DA1-AA44-4226-A7C5-62EEAB57F517}" dt="2017-12-10T22:40:26.301" v="1299" actId="1037"/>
+          <ac:picMkLst>
+            <pc:docMk/>
+            <pc:sldMk cId="0" sldId="256"/>
+            <ac:picMk id="22" creationId="{265248DE-4270-4071-8627-03B5577CAA10}"/>
+          </ac:picMkLst>
+        </pc:picChg>
+        <pc:picChg chg="add mod modCrop">
+          <ac:chgData name="Lloyd Maza" userId="5cfd7a001bc0d1c4" providerId="LiveId" clId="{8A4B9DA1-AA44-4226-A7C5-62EEAB57F517}" dt="2017-12-10T22:40:38.991" v="1301" actId="1036"/>
+          <ac:picMkLst>
+            <pc:docMk/>
+            <pc:sldMk cId="0" sldId="256"/>
+            <ac:picMk id="24" creationId="{660D2CC8-E5FD-4EDF-98C6-BD4DC86FB838}"/>
+          </ac:picMkLst>
+        </pc:picChg>
+        <pc:picChg chg="add mod modCrop">
+          <ac:chgData name="Lloyd Maza" userId="5cfd7a001bc0d1c4" providerId="LiveId" clId="{8A4B9DA1-AA44-4226-A7C5-62EEAB57F517}" dt="2017-12-10T22:40:38.991" v="1301" actId="1036"/>
+          <ac:picMkLst>
+            <pc:docMk/>
+            <pc:sldMk cId="0" sldId="256"/>
+            <ac:picMk id="26" creationId="{4A18AB49-9DFC-44D6-95E2-FADD38258289}"/>
+          </ac:picMkLst>
+        </pc:picChg>
+        <pc:cxnChg chg="add del mod">
+          <ac:chgData name="Lloyd Maza" userId="5cfd7a001bc0d1c4" providerId="LiveId" clId="{8A4B9DA1-AA44-4226-A7C5-62EEAB57F517}" dt="2017-12-10T22:28:55.674" v="759" actId="478"/>
+          <ac:cxnSpMkLst>
+            <pc:docMk/>
+            <pc:sldMk cId="0" sldId="256"/>
+            <ac:cxnSpMk id="9" creationId="{F70699E1-A091-4881-A1E2-D8E7AF112D8C}"/>
+          </ac:cxnSpMkLst>
+        </pc:cxnChg>
         <pc:cxnChg chg="add del mod">
           <ac:chgData name="Lloyd Maza" userId="5cfd7a001bc0d1c4" providerId="LiveId" clId="{8A4B9DA1-AA44-4226-A7C5-62EEAB57F517}" dt="2017-12-10T19:41:32.353" v="589" actId="478"/>
           <ac:cxnSpMkLst>
             <pc:docMk/>
             <pc:sldMk cId="0" sldId="256"/>
             <ac:cxnSpMk id="9" creationId="{62EF7DFB-7F21-400D-88C1-A8CD71775313}"/>
+          </ac:cxnSpMkLst>
+        </pc:cxnChg>
+        <pc:cxnChg chg="add mod">
+          <ac:chgData name="Lloyd Maza" userId="5cfd7a001bc0d1c4" providerId="LiveId" clId="{8A4B9DA1-AA44-4226-A7C5-62EEAB57F517}" dt="2017-12-10T22:29:32.550" v="795" actId="1582"/>
+          <ac:cxnSpMkLst>
+            <pc:docMk/>
+            <pc:sldMk cId="0" sldId="256"/>
+            <ac:cxnSpMk id="15" creationId="{5A65002C-B921-4204-A459-BED738D138E5}"/>
+          </ac:cxnSpMkLst>
+        </pc:cxnChg>
+        <pc:cxnChg chg="add del mod">
+          <ac:chgData name="Lloyd Maza" userId="5cfd7a001bc0d1c4" providerId="LiveId" clId="{8A4B9DA1-AA44-4226-A7C5-62EEAB57F517}" dt="2017-12-10T22:28:53.769" v="758" actId="478"/>
+          <ac:cxnSpMkLst>
+            <pc:docMk/>
+            <pc:sldMk cId="0" sldId="256"/>
+            <ac:cxnSpMk id="59" creationId="{11EA2C70-2727-4F66-B1CA-FE3AD1AFEB4C}"/>
+          </ac:cxnSpMkLst>
+        </pc:cxnChg>
+        <pc:cxnChg chg="add mod">
+          <ac:chgData name="Lloyd Maza" userId="5cfd7a001bc0d1c4" providerId="LiveId" clId="{8A4B9DA1-AA44-4226-A7C5-62EEAB57F517}" dt="2017-12-10T22:29:32.550" v="795" actId="1582"/>
+          <ac:cxnSpMkLst>
+            <pc:docMk/>
+            <pc:sldMk cId="0" sldId="256"/>
+            <ac:cxnSpMk id="60" creationId="{C9C0DECF-B09F-43BB-8754-F48BCAF51BAB}"/>
           </ac:cxnSpMkLst>
         </pc:cxnChg>
       </pc:sldChg>
@@ -6543,8 +6639,8 @@
           </p:txBody>
         </p:sp>
       </p:grpSp>
-      <mc:AlternateContent xmlns:mc="http://schemas.openxmlformats.org/markup-compatibility/2006">
-        <mc:Choice xmlns:a14="http://schemas.microsoft.com/office/drawing/2010/main" Requires="a14">
+      <mc:AlternateContent xmlns:mc="http://schemas.openxmlformats.org/markup-compatibility/2006" xmlns:a14="http://schemas.microsoft.com/office/drawing/2010/main">
+        <mc:Choice Requires="a14">
           <p:sp>
             <p:nvSpPr>
               <p:cNvPr id="12" name="TextBox 11">
@@ -6573,6 +6669,7 @@
               </a:bodyPr>
               <a:lstStyle/>
               <a:p>
+                <a:pPr/>
                 <a14:m>
                   <m:oMathPara xmlns:m="http://schemas.openxmlformats.org/officeDocument/2006/math">
                     <m:oMathParaPr>
@@ -6758,7 +6855,7 @@
             </p:txBody>
           </p:sp>
         </mc:Choice>
-        <mc:Fallback>
+        <mc:Fallback xmlns="">
           <p:sp>
             <p:nvSpPr>
               <p:cNvPr id="12" name="TextBox 11">
@@ -6996,6 +7093,352 @@
             <a:r>
               <a:rPr lang="en-US" sz="1800" dirty="0"/>
               <a:t>50, No. 3, 2014, pp 809-820.</a:t>
+            </a:r>
+          </a:p>
+        </p:txBody>
+      </p:sp>
+      <p:cxnSp>
+        <p:nvCxnSpPr>
+          <p:cNvPr id="15" name="Straight Connector 14">
+            <a:extLst>
+              <a:ext uri="{FF2B5EF4-FFF2-40B4-BE49-F238E27FC236}">
+                <a16:creationId xmlns:a16="http://schemas.microsoft.com/office/drawing/2014/main" id="{5A65002C-B921-4204-A459-BED738D138E5}"/>
+              </a:ext>
+            </a:extLst>
+          </p:cNvPr>
+          <p:cNvCxnSpPr>
+            <a:cxnSpLocks/>
+          </p:cNvCxnSpPr>
+          <p:nvPr/>
+        </p:nvCxnSpPr>
+        <p:spPr>
+          <a:xfrm>
+            <a:off x="13411200" y="11430000"/>
+            <a:ext cx="0" cy="9601200"/>
+          </a:xfrm>
+          <a:prstGeom prst="line">
+            <a:avLst/>
+          </a:prstGeom>
+          <a:ln w="28575">
+            <a:solidFill>
+              <a:srgbClr val="8C1515"/>
+            </a:solidFill>
+          </a:ln>
+        </p:spPr>
+        <p:style>
+          <a:lnRef idx="1">
+            <a:schemeClr val="accent1"/>
+          </a:lnRef>
+          <a:fillRef idx="0">
+            <a:schemeClr val="accent1"/>
+          </a:fillRef>
+          <a:effectRef idx="0">
+            <a:schemeClr val="accent1"/>
+          </a:effectRef>
+          <a:fontRef idx="minor">
+            <a:schemeClr val="tx1"/>
+          </a:fontRef>
+        </p:style>
+      </p:cxnSp>
+      <p:cxnSp>
+        <p:nvCxnSpPr>
+          <p:cNvPr id="60" name="Straight Connector 59">
+            <a:extLst>
+              <a:ext uri="{FF2B5EF4-FFF2-40B4-BE49-F238E27FC236}">
+                <a16:creationId xmlns:a16="http://schemas.microsoft.com/office/drawing/2014/main" id="{C9C0DECF-B09F-43BB-8754-F48BCAF51BAB}"/>
+              </a:ext>
+            </a:extLst>
+          </p:cNvPr>
+          <p:cNvCxnSpPr>
+            <a:cxnSpLocks/>
+          </p:cNvCxnSpPr>
+          <p:nvPr/>
+        </p:nvCxnSpPr>
+        <p:spPr>
+          <a:xfrm>
+            <a:off x="19555968" y="11475720"/>
+            <a:ext cx="0" cy="9509760"/>
+          </a:xfrm>
+          <a:prstGeom prst="line">
+            <a:avLst/>
+          </a:prstGeom>
+          <a:ln w="28575">
+            <a:solidFill>
+              <a:srgbClr val="8C1515"/>
+            </a:solidFill>
+          </a:ln>
+        </p:spPr>
+        <p:style>
+          <a:lnRef idx="1">
+            <a:schemeClr val="accent1"/>
+          </a:lnRef>
+          <a:fillRef idx="0">
+            <a:schemeClr val="accent1"/>
+          </a:fillRef>
+          <a:effectRef idx="0">
+            <a:schemeClr val="accent1"/>
+          </a:effectRef>
+          <a:fontRef idx="minor">
+            <a:schemeClr val="tx1"/>
+          </a:fontRef>
+        </p:style>
+      </p:cxnSp>
+      <p:sp>
+        <p:nvSpPr>
+          <p:cNvPr id="62" name="TextBox 61">
+            <a:extLst>
+              <a:ext uri="{FF2B5EF4-FFF2-40B4-BE49-F238E27FC236}">
+                <a16:creationId xmlns:a16="http://schemas.microsoft.com/office/drawing/2014/main" id="{9F7E9392-6A19-456C-8B8C-7B4C60077DF3}"/>
+              </a:ext>
+            </a:extLst>
+          </p:cNvPr>
+          <p:cNvSpPr txBox="1"/>
+          <p:nvPr/>
+        </p:nvSpPr>
+        <p:spPr>
+          <a:xfrm>
+            <a:off x="7391399" y="11211580"/>
+            <a:ext cx="5867395" cy="954107"/>
+          </a:xfrm>
+          <a:prstGeom prst="rect">
+            <a:avLst/>
+          </a:prstGeom>
+          <a:noFill/>
+        </p:spPr>
+        <p:txBody>
+          <a:bodyPr wrap="square" rtlCol="0">
+            <a:spAutoFit/>
+          </a:bodyPr>
+          <a:lstStyle/>
+          <a:p>
+            <a:pPr algn="ctr">
+              <a:spcAft>
+                <a:spcPts val="600"/>
+              </a:spcAft>
+            </a:pPr>
+            <a:r>
+              <a:rPr lang="en-US" sz="2800" b="1" dirty="0"/>
+              <a:t>Learning an Unknown Environment</a:t>
+            </a:r>
+          </a:p>
+        </p:txBody>
+      </p:sp>
+      <p:pic>
+        <p:nvPicPr>
+          <p:cNvPr id="19" name="Picture 18">
+            <a:extLst>
+              <a:ext uri="{FF2B5EF4-FFF2-40B4-BE49-F238E27FC236}">
+                <a16:creationId xmlns:a16="http://schemas.microsoft.com/office/drawing/2014/main" id="{BD827A07-8861-4ED7-94A6-4388C2461024}"/>
+              </a:ext>
+            </a:extLst>
+          </p:cNvPr>
+          <p:cNvPicPr>
+            <a:picLocks noChangeAspect="1"/>
+          </p:cNvPicPr>
+          <p:nvPr/>
+        </p:nvPicPr>
+        <p:blipFill rotWithShape="1">
+          <a:blip r:embed="rId8">
+            <a:extLst>
+              <a:ext uri="{28A0092B-C50C-407E-A947-70E740481C1C}">
+                <a14:useLocalDpi xmlns:a14="http://schemas.microsoft.com/office/drawing/2010/main" val="0"/>
+              </a:ext>
+            </a:extLst>
+          </a:blip>
+          <a:srcRect l="13424" t="4280" r="15710"/>
+          <a:stretch/>
+        </p:blipFill>
+        <p:spPr>
+          <a:xfrm>
+            <a:off x="7655308" y="13206187"/>
+            <a:ext cx="2707892" cy="2743200"/>
+          </a:xfrm>
+          <a:prstGeom prst="rect">
+            <a:avLst/>
+          </a:prstGeom>
+        </p:spPr>
+      </p:pic>
+      <p:pic>
+        <p:nvPicPr>
+          <p:cNvPr id="22" name="Picture 21">
+            <a:extLst>
+              <a:ext uri="{FF2B5EF4-FFF2-40B4-BE49-F238E27FC236}">
+                <a16:creationId xmlns:a16="http://schemas.microsoft.com/office/drawing/2014/main" id="{265248DE-4270-4071-8627-03B5577CAA10}"/>
+              </a:ext>
+            </a:extLst>
+          </p:cNvPr>
+          <p:cNvPicPr>
+            <a:picLocks noChangeAspect="1"/>
+          </p:cNvPicPr>
+          <p:nvPr/>
+        </p:nvPicPr>
+        <p:blipFill rotWithShape="1">
+          <a:blip r:embed="rId9">
+            <a:extLst>
+              <a:ext uri="{28A0092B-C50C-407E-A947-70E740481C1C}">
+                <a14:useLocalDpi xmlns:a14="http://schemas.microsoft.com/office/drawing/2010/main" val="0"/>
+              </a:ext>
+            </a:extLst>
+          </a:blip>
+          <a:srcRect l="13423" t="4280" r="14276"/>
+          <a:stretch/>
+        </p:blipFill>
+        <p:spPr>
+          <a:xfrm>
+            <a:off x="10363200" y="13206187"/>
+            <a:ext cx="2762691" cy="2743200"/>
+          </a:xfrm>
+          <a:prstGeom prst="rect">
+            <a:avLst/>
+          </a:prstGeom>
+        </p:spPr>
+      </p:pic>
+      <p:pic>
+        <p:nvPicPr>
+          <p:cNvPr id="24" name="Picture 23">
+            <a:extLst>
+              <a:ext uri="{FF2B5EF4-FFF2-40B4-BE49-F238E27FC236}">
+                <a16:creationId xmlns:a16="http://schemas.microsoft.com/office/drawing/2014/main" id="{660D2CC8-E5FD-4EDF-98C6-BD4DC86FB838}"/>
+              </a:ext>
+            </a:extLst>
+          </p:cNvPr>
+          <p:cNvPicPr>
+            <a:picLocks noChangeAspect="1"/>
+          </p:cNvPicPr>
+          <p:nvPr/>
+        </p:nvPicPr>
+        <p:blipFill rotWithShape="1">
+          <a:blip r:embed="rId10">
+            <a:extLst>
+              <a:ext uri="{28A0092B-C50C-407E-A947-70E740481C1C}">
+                <a14:useLocalDpi xmlns:a14="http://schemas.microsoft.com/office/drawing/2010/main" val="0"/>
+              </a:ext>
+            </a:extLst>
+          </a:blip>
+          <a:srcRect l="13423" t="4744" r="14276"/>
+          <a:stretch/>
+        </p:blipFill>
+        <p:spPr>
+          <a:xfrm>
+            <a:off x="7561385" y="17602200"/>
+            <a:ext cx="2776154" cy="2743200"/>
+          </a:xfrm>
+          <a:prstGeom prst="rect">
+            <a:avLst/>
+          </a:prstGeom>
+        </p:spPr>
+      </p:pic>
+      <p:pic>
+        <p:nvPicPr>
+          <p:cNvPr id="26" name="Picture 25">
+            <a:extLst>
+              <a:ext uri="{FF2B5EF4-FFF2-40B4-BE49-F238E27FC236}">
+                <a16:creationId xmlns:a16="http://schemas.microsoft.com/office/drawing/2014/main" id="{4A18AB49-9DFC-44D6-95E2-FADD38258289}"/>
+              </a:ext>
+            </a:extLst>
+          </p:cNvPr>
+          <p:cNvPicPr>
+            <a:picLocks noChangeAspect="1"/>
+          </p:cNvPicPr>
+          <p:nvPr/>
+        </p:nvPicPr>
+        <p:blipFill rotWithShape="1">
+          <a:blip r:embed="rId11">
+            <a:extLst>
+              <a:ext uri="{28A0092B-C50C-407E-A947-70E740481C1C}">
+                <a14:useLocalDpi xmlns:a14="http://schemas.microsoft.com/office/drawing/2010/main" val="0"/>
+              </a:ext>
+            </a:extLst>
+          </a:blip>
+          <a:srcRect l="13996" t="4903" r="15139"/>
+          <a:stretch/>
+        </p:blipFill>
+        <p:spPr>
+          <a:xfrm>
+            <a:off x="10380785" y="17589500"/>
+            <a:ext cx="2725615" cy="2743200"/>
+          </a:xfrm>
+          <a:prstGeom prst="rect">
+            <a:avLst/>
+          </a:prstGeom>
+        </p:spPr>
+      </p:pic>
+      <p:sp>
+        <p:nvSpPr>
+          <p:cNvPr id="63" name="TextBox 62">
+            <a:extLst>
+              <a:ext uri="{FF2B5EF4-FFF2-40B4-BE49-F238E27FC236}">
+                <a16:creationId xmlns:a16="http://schemas.microsoft.com/office/drawing/2014/main" id="{3B96B831-EAC2-4E77-B47E-DB3BDDD44C3C}"/>
+              </a:ext>
+            </a:extLst>
+          </p:cNvPr>
+          <p:cNvSpPr txBox="1"/>
+          <p:nvPr/>
+        </p:nvSpPr>
+        <p:spPr>
+          <a:xfrm>
+            <a:off x="7391400" y="12178947"/>
+            <a:ext cx="5867395" cy="954107"/>
+          </a:xfrm>
+          <a:prstGeom prst="rect">
+            <a:avLst/>
+          </a:prstGeom>
+          <a:noFill/>
+        </p:spPr>
+        <p:txBody>
+          <a:bodyPr wrap="square" rtlCol="0">
+            <a:spAutoFit/>
+          </a:bodyPr>
+          <a:lstStyle/>
+          <a:p>
+            <a:pPr>
+              <a:spcAft>
+                <a:spcPts val="600"/>
+              </a:spcAft>
+            </a:pPr>
+            <a:r>
+              <a:rPr lang="en-US" sz="2800" dirty="0"/>
+              <a:t>The environment is initialized with a group of unseen threats </a:t>
+            </a:r>
+          </a:p>
+        </p:txBody>
+      </p:sp>
+      <p:sp>
+        <p:nvSpPr>
+          <p:cNvPr id="64" name="TextBox 63">
+            <a:extLst>
+              <a:ext uri="{FF2B5EF4-FFF2-40B4-BE49-F238E27FC236}">
+                <a16:creationId xmlns:a16="http://schemas.microsoft.com/office/drawing/2014/main" id="{7A35AC6A-B414-4A1C-8EC6-7565C63E20D2}"/>
+              </a:ext>
+            </a:extLst>
+          </p:cNvPr>
+          <p:cNvSpPr txBox="1"/>
+          <p:nvPr/>
+        </p:nvSpPr>
+        <p:spPr>
+          <a:xfrm>
+            <a:off x="7391400" y="15988605"/>
+            <a:ext cx="5867395" cy="1384995"/>
+          </a:xfrm>
+          <a:prstGeom prst="rect">
+            <a:avLst/>
+          </a:prstGeom>
+          <a:noFill/>
+        </p:spPr>
+        <p:txBody>
+          <a:bodyPr wrap="square" rtlCol="0">
+            <a:spAutoFit/>
+          </a:bodyPr>
+          <a:lstStyle/>
+          <a:p>
+            <a:pPr>
+              <a:spcAft>
+                <a:spcPts val="600"/>
+              </a:spcAft>
+            </a:pPr>
+            <a:r>
+              <a:rPr lang="en-US" sz="2800" dirty="0"/>
+              <a:t>CGLA is iteratively executed to update the path as the agent encounters unseen threats</a:t>
             </a:r>
           </a:p>
         </p:txBody>

</xml_diff>

<commit_message>
Added my writing to poster, scenario plots tbd
Scenario plots are still*.fig
</commit_message>
<xml_diff>
--- a/Deliverables/Poster/CS229_FinalPoster.pptx
+++ b/Deliverables/Poster/CS229_FinalPoster.pptx
@@ -5,10 +5,12 @@
     <p:sldMasterId id="2147483648" r:id="rId1"/>
   </p:sldMasterIdLst>
   <p:notesMasterIdLst>
-    <p:notesMasterId r:id="rId3"/>
+    <p:notesMasterId r:id="rId5"/>
   </p:notesMasterIdLst>
   <p:sldIdLst>
     <p:sldId id="256" r:id="rId2"/>
+    <p:sldId id="258" r:id="rId3"/>
+    <p:sldId id="257" r:id="rId4"/>
   </p:sldIdLst>
   <p:sldSz cx="32918400" cy="21945600"/>
   <p:notesSz cx="7315200" cy="9601200"/>
@@ -154,6 +156,22 @@
     </p:ext>
   </p:extLst>
 </p:presentation>
+</file>
+
+<file path=ppt/commentAuthors.xml><?xml version="1.0" encoding="utf-8"?>
+<p:cmAuthorLst xmlns:a="http://schemas.openxmlformats.org/drawingml/2006/main" xmlns:r="http://schemas.openxmlformats.org/officeDocument/2006/relationships" xmlns:p="http://schemas.openxmlformats.org/presentationml/2006/main">
+  <p:cmAuthor id="1" name="McMillan, Cameron B" initials="MCB" lastIdx="1" clrIdx="0">
+    <p:extLst>
+      <p:ext uri="{19B8F6BF-5375-455C-9EA6-DF929625EA0E}">
+        <p15:presenceInfo xmlns:p15="http://schemas.microsoft.com/office/powerpoint/2012/main" userId="McMillan, Cameron B" providerId="None"/>
+      </p:ext>
+    </p:extLst>
+  </p:cmAuthor>
+</p:cmAuthorLst>
+</file>
+
+<file path=ppt/revisionInfo.xml><?xml version="1.0" encoding="utf-8"?>
+<p1510:revInfo xmlns:a="http://schemas.openxmlformats.org/drawingml/2006/main" xmlns:r="http://schemas.openxmlformats.org/officeDocument/2006/relationships" xmlns:p1510="http://schemas.microsoft.com/office/powerpoint/2015/10/main"/>
 </file>
 
 <file path=ppt/changesInfos/changesInfo1.xml><?xml version="1.0" encoding="utf-8"?>
@@ -1218,6 +1236,305 @@
         </p:txBody>
       </p:sp>
     </p:spTree>
+  </p:cSld>
+  <p:clrMapOvr>
+    <a:masterClrMapping/>
+  </p:clrMapOvr>
+</p:notes>
+</file>
+
+<file path=ppt/notesSlides/notesSlide2.xml><?xml version="1.0" encoding="utf-8"?>
+<p:notes xmlns:a="http://schemas.openxmlformats.org/drawingml/2006/main" xmlns:r="http://schemas.openxmlformats.org/officeDocument/2006/relationships" xmlns:p="http://schemas.openxmlformats.org/presentationml/2006/main">
+  <p:cSld>
+    <p:spTree>
+      <p:nvGrpSpPr>
+        <p:cNvPr id="1" name=""/>
+        <p:cNvGrpSpPr/>
+        <p:nvPr/>
+      </p:nvGrpSpPr>
+      <p:grpSpPr>
+        <a:xfrm>
+          <a:off x="0" y="0"/>
+          <a:ext cx="0" cy="0"/>
+          <a:chOff x="0" y="0"/>
+          <a:chExt cx="0" cy="0"/>
+        </a:xfrm>
+      </p:grpSpPr>
+      <p:sp>
+        <p:nvSpPr>
+          <p:cNvPr id="4098" name="Slide Image Placeholder 1">
+            <a:extLst>
+              <a:ext uri="{FF2B5EF4-FFF2-40B4-BE49-F238E27FC236}">
+                <a16:creationId xmlns:a16="http://schemas.microsoft.com/office/drawing/2014/main" id="{C4C86A8A-918B-4C92-8022-DDFB8D7E9D3F}"/>
+              </a:ext>
+            </a:extLst>
+          </p:cNvPr>
+          <p:cNvSpPr>
+            <a:spLocks noGrp="1" noRot="1" noChangeAspect="1" noTextEdit="1"/>
+          </p:cNvSpPr>
+          <p:nvPr>
+            <p:ph type="sldImg"/>
+          </p:nvPr>
+        </p:nvSpPr>
+        <p:spPr bwMode="auto">
+          <a:noFill/>
+          <a:ln>
+            <a:solidFill>
+              <a:srgbClr val="000000"/>
+            </a:solidFill>
+            <a:miter lim="800000"/>
+            <a:headEnd/>
+            <a:tailEnd/>
+          </a:ln>
+          <a:extLst>
+            <a:ext uri="{909E8E84-426E-40DD-AFC4-6F175D3DCCD1}">
+              <a14:hiddenFill xmlns:a14="http://schemas.microsoft.com/office/drawing/2010/main">
+                <a:solidFill>
+                  <a:srgbClr val="FFFFFF"/>
+                </a:solidFill>
+              </a14:hiddenFill>
+            </a:ext>
+          </a:extLst>
+        </p:spPr>
+      </p:sp>
+      <p:sp>
+        <p:nvSpPr>
+          <p:cNvPr id="4099" name="Notes Placeholder 2">
+            <a:extLst>
+              <a:ext uri="{FF2B5EF4-FFF2-40B4-BE49-F238E27FC236}">
+                <a16:creationId xmlns:a16="http://schemas.microsoft.com/office/drawing/2014/main" id="{A2284248-CC04-423F-99F4-40B9945C5983}"/>
+              </a:ext>
+            </a:extLst>
+          </p:cNvPr>
+          <p:cNvSpPr>
+            <a:spLocks noGrp="1"/>
+          </p:cNvSpPr>
+          <p:nvPr>
+            <p:ph type="body" idx="1"/>
+          </p:nvPr>
+        </p:nvSpPr>
+        <p:spPr bwMode="auto">
+          <a:noFill/>
+          <a:extLst>
+            <a:ext uri="{909E8E84-426E-40DD-AFC4-6F175D3DCCD1}">
+              <a14:hiddenFill xmlns:a14="http://schemas.microsoft.com/office/drawing/2010/main">
+                <a:solidFill>
+                  <a:srgbClr val="FFFFFF"/>
+                </a:solidFill>
+              </a14:hiddenFill>
+            </a:ext>
+            <a:ext uri="{91240B29-F687-4F45-9708-019B960494DF}">
+              <a14:hiddenLine xmlns:a14="http://schemas.microsoft.com/office/drawing/2010/main" w="9525">
+                <a:solidFill>
+                  <a:srgbClr val="000000"/>
+                </a:solidFill>
+                <a:miter lim="800000"/>
+                <a:headEnd/>
+                <a:tailEnd/>
+              </a14:hiddenLine>
+            </a:ext>
+          </a:extLst>
+        </p:spPr>
+        <p:txBody>
+          <a:bodyPr/>
+          <a:lstStyle/>
+          <a:p>
+            <a:pPr eaLnBrk="1" hangingPunct="1">
+              <a:spcBef>
+                <a:spcPct val="0"/>
+              </a:spcBef>
+            </a:pPr>
+            <a:endParaRPr lang="zh-TW" altLang="en-US"/>
+          </a:p>
+        </p:txBody>
+      </p:sp>
+      <p:sp>
+        <p:nvSpPr>
+          <p:cNvPr id="4100" name="Slide Number Placeholder 3">
+            <a:extLst>
+              <a:ext uri="{FF2B5EF4-FFF2-40B4-BE49-F238E27FC236}">
+                <a16:creationId xmlns:a16="http://schemas.microsoft.com/office/drawing/2014/main" id="{761BFFAC-9D49-4B0B-88BC-C5D5CEB1DADB}"/>
+              </a:ext>
+            </a:extLst>
+          </p:cNvPr>
+          <p:cNvSpPr>
+            <a:spLocks noGrp="1"/>
+          </p:cNvSpPr>
+          <p:nvPr>
+            <p:ph type="sldNum" sz="quarter" idx="5"/>
+          </p:nvPr>
+        </p:nvSpPr>
+        <p:spPr bwMode="auto">
+          <a:noFill/>
+          <a:extLst>
+            <a:ext uri="{909E8E84-426E-40DD-AFC4-6F175D3DCCD1}">
+              <a14:hiddenFill xmlns:a14="http://schemas.microsoft.com/office/drawing/2010/main">
+                <a:solidFill>
+                  <a:srgbClr val="FFFFFF"/>
+                </a:solidFill>
+              </a14:hiddenFill>
+            </a:ext>
+            <a:ext uri="{91240B29-F687-4F45-9708-019B960494DF}">
+              <a14:hiddenLine xmlns:a14="http://schemas.microsoft.com/office/drawing/2010/main" w="9525">
+                <a:solidFill>
+                  <a:srgbClr val="000000"/>
+                </a:solidFill>
+                <a:miter lim="800000"/>
+                <a:headEnd/>
+                <a:tailEnd/>
+              </a14:hiddenLine>
+            </a:ext>
+          </a:extLst>
+        </p:spPr>
+        <p:txBody>
+          <a:bodyPr/>
+          <a:lstStyle>
+            <a:lvl1pPr>
+              <a:spcBef>
+                <a:spcPct val="30000"/>
+              </a:spcBef>
+              <a:defRPr sz="4100">
+                <a:solidFill>
+                  <a:schemeClr val="tx1"/>
+                </a:solidFill>
+                <a:latin typeface="Calibri" panose="020F0502020204030204" pitchFamily="34" charset="0"/>
+                <a:ea typeface="PMingLiU" panose="02020500000000000000" pitchFamily="18" charset="-120"/>
+              </a:defRPr>
+            </a:lvl1pPr>
+            <a:lvl2pPr marL="742950" indent="-285750">
+              <a:spcBef>
+                <a:spcPct val="30000"/>
+              </a:spcBef>
+              <a:defRPr sz="4100">
+                <a:solidFill>
+                  <a:schemeClr val="tx1"/>
+                </a:solidFill>
+                <a:latin typeface="Calibri" panose="020F0502020204030204" pitchFamily="34" charset="0"/>
+                <a:ea typeface="PMingLiU" panose="02020500000000000000" pitchFamily="18" charset="-120"/>
+              </a:defRPr>
+            </a:lvl2pPr>
+            <a:lvl3pPr marL="1143000" indent="-228600">
+              <a:spcBef>
+                <a:spcPct val="30000"/>
+              </a:spcBef>
+              <a:defRPr sz="4100">
+                <a:solidFill>
+                  <a:schemeClr val="tx1"/>
+                </a:solidFill>
+                <a:latin typeface="Calibri" panose="020F0502020204030204" pitchFamily="34" charset="0"/>
+                <a:ea typeface="PMingLiU" panose="02020500000000000000" pitchFamily="18" charset="-120"/>
+              </a:defRPr>
+            </a:lvl3pPr>
+            <a:lvl4pPr marL="1600200" indent="-228600">
+              <a:spcBef>
+                <a:spcPct val="30000"/>
+              </a:spcBef>
+              <a:defRPr sz="4100">
+                <a:solidFill>
+                  <a:schemeClr val="tx1"/>
+                </a:solidFill>
+                <a:latin typeface="Calibri" panose="020F0502020204030204" pitchFamily="34" charset="0"/>
+                <a:ea typeface="PMingLiU" panose="02020500000000000000" pitchFamily="18" charset="-120"/>
+              </a:defRPr>
+            </a:lvl4pPr>
+            <a:lvl5pPr marL="2057400" indent="-228600">
+              <a:spcBef>
+                <a:spcPct val="30000"/>
+              </a:spcBef>
+              <a:defRPr sz="4100">
+                <a:solidFill>
+                  <a:schemeClr val="tx1"/>
+                </a:solidFill>
+                <a:latin typeface="Calibri" panose="020F0502020204030204" pitchFamily="34" charset="0"/>
+                <a:ea typeface="PMingLiU" panose="02020500000000000000" pitchFamily="18" charset="-120"/>
+              </a:defRPr>
+            </a:lvl5pPr>
+            <a:lvl6pPr marL="2514600" indent="-228600" defTabSz="3133725" eaLnBrk="0" fontAlgn="base" hangingPunct="0">
+              <a:spcBef>
+                <a:spcPct val="30000"/>
+              </a:spcBef>
+              <a:spcAft>
+                <a:spcPct val="0"/>
+              </a:spcAft>
+              <a:defRPr sz="4100">
+                <a:solidFill>
+                  <a:schemeClr val="tx1"/>
+                </a:solidFill>
+                <a:latin typeface="Calibri" panose="020F0502020204030204" pitchFamily="34" charset="0"/>
+                <a:ea typeface="PMingLiU" panose="02020500000000000000" pitchFamily="18" charset="-120"/>
+              </a:defRPr>
+            </a:lvl6pPr>
+            <a:lvl7pPr marL="2971800" indent="-228600" defTabSz="3133725" eaLnBrk="0" fontAlgn="base" hangingPunct="0">
+              <a:spcBef>
+                <a:spcPct val="30000"/>
+              </a:spcBef>
+              <a:spcAft>
+                <a:spcPct val="0"/>
+              </a:spcAft>
+              <a:defRPr sz="4100">
+                <a:solidFill>
+                  <a:schemeClr val="tx1"/>
+                </a:solidFill>
+                <a:latin typeface="Calibri" panose="020F0502020204030204" pitchFamily="34" charset="0"/>
+                <a:ea typeface="PMingLiU" panose="02020500000000000000" pitchFamily="18" charset="-120"/>
+              </a:defRPr>
+            </a:lvl7pPr>
+            <a:lvl8pPr marL="3429000" indent="-228600" defTabSz="3133725" eaLnBrk="0" fontAlgn="base" hangingPunct="0">
+              <a:spcBef>
+                <a:spcPct val="30000"/>
+              </a:spcBef>
+              <a:spcAft>
+                <a:spcPct val="0"/>
+              </a:spcAft>
+              <a:defRPr sz="4100">
+                <a:solidFill>
+                  <a:schemeClr val="tx1"/>
+                </a:solidFill>
+                <a:latin typeface="Calibri" panose="020F0502020204030204" pitchFamily="34" charset="0"/>
+                <a:ea typeface="PMingLiU" panose="02020500000000000000" pitchFamily="18" charset="-120"/>
+              </a:defRPr>
+            </a:lvl8pPr>
+            <a:lvl9pPr marL="3886200" indent="-228600" defTabSz="3133725" eaLnBrk="0" fontAlgn="base" hangingPunct="0">
+              <a:spcBef>
+                <a:spcPct val="30000"/>
+              </a:spcBef>
+              <a:spcAft>
+                <a:spcPct val="0"/>
+              </a:spcAft>
+              <a:defRPr sz="4100">
+                <a:solidFill>
+                  <a:schemeClr val="tx1"/>
+                </a:solidFill>
+                <a:latin typeface="Calibri" panose="020F0502020204030204" pitchFamily="34" charset="0"/>
+                <a:ea typeface="PMingLiU" panose="02020500000000000000" pitchFamily="18" charset="-120"/>
+              </a:defRPr>
+            </a:lvl9pPr>
+          </a:lstStyle>
+          <a:p>
+            <a:pPr>
+              <a:spcBef>
+                <a:spcPct val="0"/>
+              </a:spcBef>
+            </a:pPr>
+            <a:fld id="{7B1C47E6-A950-48C3-BA15-F5B1C937041F}" type="slidenum">
+              <a:rPr lang="zh-TW" altLang="en-US" sz="1300" smtClean="0"/>
+              <a:pPr>
+                <a:spcBef>
+                  <a:spcPct val="0"/>
+                </a:spcBef>
+              </a:pPr>
+              <a:t>2</a:t>
+            </a:fld>
+            <a:endParaRPr lang="zh-TW" altLang="en-US" sz="1300"/>
+          </a:p>
+        </p:txBody>
+      </p:sp>
+    </p:spTree>
+    <p:extLst>
+      <p:ext uri="{BB962C8B-B14F-4D97-AF65-F5344CB8AC3E}">
+        <p14:creationId xmlns:p14="http://schemas.microsoft.com/office/powerpoint/2010/main" val="614704740"/>
+      </p:ext>
+    </p:extLst>
   </p:cSld>
   <p:clrMapOvr>
     <a:masterClrMapping/>
@@ -7443,7 +7760,3462 @@
           </a:p>
         </p:txBody>
       </p:sp>
+      <p:sp>
+        <p:nvSpPr>
+          <p:cNvPr id="8" name="TextBox 7">
+            <a:extLst>
+              <a:ext uri="{FF2B5EF4-FFF2-40B4-BE49-F238E27FC236}">
+                <a16:creationId xmlns:a16="http://schemas.microsoft.com/office/drawing/2014/main" id="{4A20AB0C-579F-4D2E-B0BB-620AB2C4D23E}"/>
+              </a:ext>
+            </a:extLst>
+          </p:cNvPr>
+          <p:cNvSpPr txBox="1"/>
+          <p:nvPr/>
+        </p:nvSpPr>
+        <p:spPr>
+          <a:xfrm>
+            <a:off x="548481" y="5512023"/>
+            <a:ext cx="5943600" cy="4616648"/>
+          </a:xfrm>
+          <a:prstGeom prst="rect">
+            <a:avLst/>
+          </a:prstGeom>
+          <a:noFill/>
+        </p:spPr>
+        <p:txBody>
+          <a:bodyPr wrap="square" rtlCol="0">
+            <a:spAutoFit/>
+          </a:bodyPr>
+          <a:lstStyle/>
+          <a:p>
+            <a:r>
+              <a:rPr lang="en-US" sz="2800" dirty="0"/>
+              <a:t>Proliferation of low cost UAVs allows them to explore more dangerous environments. Novel path planning algorithms are needed to control these UAVs.</a:t>
+            </a:r>
+          </a:p>
+          <a:p>
+            <a:endParaRPr lang="en-US" sz="1400" dirty="0"/>
+          </a:p>
+          <a:p>
+            <a:r>
+              <a:rPr lang="en-US" sz="2800" b="1" dirty="0"/>
+              <a:t>Problems</a:t>
+            </a:r>
+            <a:r>
+              <a:rPr lang="en-US" sz="2800" dirty="0"/>
+              <a:t>: </a:t>
+            </a:r>
+          </a:p>
+          <a:p>
+            <a:pPr marL="457200" indent="-457200">
+              <a:buFont typeface="Arial" panose="020B0604020202020204" pitchFamily="34" charset="0"/>
+              <a:buChar char="•"/>
+            </a:pPr>
+            <a:r>
+              <a:rPr lang="en-US" sz="2800" dirty="0"/>
+              <a:t>Unknown risk environment</a:t>
+            </a:r>
+          </a:p>
+          <a:p>
+            <a:pPr marL="457200" indent="-457200">
+              <a:buFont typeface="Arial" panose="020B0604020202020204" pitchFamily="34" charset="0"/>
+              <a:buChar char="•"/>
+            </a:pPr>
+            <a:r>
+              <a:rPr lang="en-US" sz="2800" dirty="0"/>
+              <a:t>Real time planning</a:t>
+            </a:r>
+          </a:p>
+          <a:p>
+            <a:pPr marL="457200" indent="-457200">
+              <a:buFont typeface="Arial" panose="020B0604020202020204" pitchFamily="34" charset="0"/>
+              <a:buChar char="•"/>
+            </a:pPr>
+            <a:r>
+              <a:rPr lang="en-US" sz="2800" dirty="0"/>
+              <a:t>Multiple cooperative agents</a:t>
+            </a:r>
+          </a:p>
+          <a:p>
+            <a:pPr marL="457200" indent="-457200">
+              <a:buFont typeface="Arial" panose="020B0604020202020204" pitchFamily="34" charset="0"/>
+              <a:buChar char="•"/>
+            </a:pPr>
+            <a:r>
+              <a:rPr lang="en-US" sz="2800" dirty="0"/>
+              <a:t>Multiple targets</a:t>
+            </a:r>
+          </a:p>
+        </p:txBody>
+      </p:sp>
+      <p:pic>
+        <p:nvPicPr>
+          <p:cNvPr id="13" name="Picture 12">
+            <a:extLst>
+              <a:ext uri="{FF2B5EF4-FFF2-40B4-BE49-F238E27FC236}">
+                <a16:creationId xmlns:a16="http://schemas.microsoft.com/office/drawing/2014/main" id="{589539F1-481F-4870-83FE-89FF83A277E5}"/>
+              </a:ext>
+            </a:extLst>
+          </p:cNvPr>
+          <p:cNvPicPr>
+            <a:picLocks noChangeAspect="1"/>
+          </p:cNvPicPr>
+          <p:nvPr/>
+        </p:nvPicPr>
+        <p:blipFill>
+          <a:blip r:embed="rId12">
+            <a:extLst>
+              <a:ext uri="{28A0092B-C50C-407E-A947-70E740481C1C}">
+                <a14:useLocalDpi xmlns:a14="http://schemas.microsoft.com/office/drawing/2010/main" val="0"/>
+              </a:ext>
+            </a:extLst>
+          </a:blip>
+          <a:stretch>
+            <a:fillRect/>
+          </a:stretch>
+        </p:blipFill>
+        <p:spPr>
+          <a:xfrm>
+            <a:off x="2644543" y="11810441"/>
+            <a:ext cx="3968329" cy="2567013"/>
+          </a:xfrm>
+          <a:prstGeom prst="rect">
+            <a:avLst/>
+          </a:prstGeom>
+        </p:spPr>
+      </p:pic>
+      <p:pic>
+        <p:nvPicPr>
+          <p:cNvPr id="23" name="Picture 22">
+            <a:extLst>
+              <a:ext uri="{FF2B5EF4-FFF2-40B4-BE49-F238E27FC236}">
+                <a16:creationId xmlns:a16="http://schemas.microsoft.com/office/drawing/2014/main" id="{CB91CD3B-0CE3-46B9-ADF0-0C1270D7A0D5}"/>
+              </a:ext>
+            </a:extLst>
+          </p:cNvPr>
+          <p:cNvPicPr>
+            <a:picLocks noChangeAspect="1"/>
+          </p:cNvPicPr>
+          <p:nvPr/>
+        </p:nvPicPr>
+        <p:blipFill>
+          <a:blip r:embed="rId13">
+            <a:extLst>
+              <a:ext uri="{28A0092B-C50C-407E-A947-70E740481C1C}">
+                <a14:useLocalDpi xmlns:a14="http://schemas.microsoft.com/office/drawing/2010/main" val="0"/>
+              </a:ext>
+            </a:extLst>
+          </a:blip>
+          <a:stretch>
+            <a:fillRect/>
+          </a:stretch>
+        </p:blipFill>
+        <p:spPr>
+          <a:xfrm>
+            <a:off x="411163" y="11819809"/>
+            <a:ext cx="2266228" cy="2545242"/>
+          </a:xfrm>
+          <a:prstGeom prst="rect">
+            <a:avLst/>
+          </a:prstGeom>
+        </p:spPr>
+      </p:pic>
+      <p:sp>
+        <p:nvSpPr>
+          <p:cNvPr id="25" name="TextBox 24">
+            <a:extLst>
+              <a:ext uri="{FF2B5EF4-FFF2-40B4-BE49-F238E27FC236}">
+                <a16:creationId xmlns:a16="http://schemas.microsoft.com/office/drawing/2014/main" id="{DF5C689E-6A3E-4DE8-9DE0-44D23F3DA370}"/>
+              </a:ext>
+            </a:extLst>
+          </p:cNvPr>
+          <p:cNvSpPr txBox="1"/>
+          <p:nvPr/>
+        </p:nvSpPr>
+        <p:spPr>
+          <a:xfrm>
+            <a:off x="422048" y="14389100"/>
+            <a:ext cx="6147103" cy="6124754"/>
+          </a:xfrm>
+          <a:prstGeom prst="rect">
+            <a:avLst/>
+          </a:prstGeom>
+          <a:noFill/>
+        </p:spPr>
+        <p:txBody>
+          <a:bodyPr wrap="square" rtlCol="0">
+            <a:spAutoFit/>
+          </a:bodyPr>
+          <a:lstStyle/>
+          <a:p>
+            <a:r>
+              <a:rPr lang="en-US" sz="2800" b="1" dirty="0"/>
+              <a:t>Scenario Environment</a:t>
+            </a:r>
+          </a:p>
+          <a:p>
+            <a:pPr marL="457200" indent="-457200">
+              <a:buFont typeface="Arial" panose="020B0604020202020204" pitchFamily="34" charset="0"/>
+              <a:buChar char="•"/>
+            </a:pPr>
+            <a:r>
+              <a:rPr lang="en-US" sz="2800" dirty="0"/>
+              <a:t>Unknown environment with threats representing anti-air/jamming</a:t>
+            </a:r>
+          </a:p>
+          <a:p>
+            <a:pPr marL="457200" indent="-457200">
+              <a:buFont typeface="Arial" panose="020B0604020202020204" pitchFamily="34" charset="0"/>
+              <a:buChar char="•"/>
+            </a:pPr>
+            <a:r>
+              <a:rPr lang="en-US" sz="2800" dirty="0"/>
+              <a:t>Realistic observation radius to discover threats</a:t>
+            </a:r>
+          </a:p>
+          <a:p>
+            <a:pPr marL="457200" indent="-457200">
+              <a:buFont typeface="Arial" panose="020B0604020202020204" pitchFamily="34" charset="0"/>
+              <a:buChar char="•"/>
+            </a:pPr>
+            <a:r>
+              <a:rPr lang="en-US" sz="2800" dirty="0"/>
+              <a:t>Must visit all targets in each scenario</a:t>
+            </a:r>
+          </a:p>
+          <a:p>
+            <a:pPr marL="457200" indent="-457200">
+              <a:buFont typeface="Arial" panose="020B0604020202020204" pitchFamily="34" charset="0"/>
+              <a:buChar char="•"/>
+            </a:pPr>
+            <a:endParaRPr lang="en-US" sz="2800" dirty="0"/>
+          </a:p>
+          <a:p>
+            <a:pPr marL="457200" indent="-457200">
+              <a:buFont typeface="Arial" panose="020B0604020202020204" pitchFamily="34" charset="0"/>
+              <a:buChar char="•"/>
+            </a:pPr>
+            <a:endParaRPr lang="en-US" sz="2800" dirty="0"/>
+          </a:p>
+          <a:p>
+            <a:pPr marL="457200" indent="-457200">
+              <a:buFont typeface="Arial" panose="020B0604020202020204" pitchFamily="34" charset="0"/>
+              <a:buChar char="•"/>
+            </a:pPr>
+            <a:endParaRPr lang="en-US" sz="2800" dirty="0"/>
+          </a:p>
+          <a:p>
+            <a:pPr marL="457200" indent="-457200">
+              <a:buFont typeface="Arial" panose="020B0604020202020204" pitchFamily="34" charset="0"/>
+              <a:buChar char="•"/>
+            </a:pPr>
+            <a:endParaRPr lang="en-US" sz="2800" dirty="0"/>
+          </a:p>
+          <a:p>
+            <a:pPr marL="457200" indent="-457200">
+              <a:buFont typeface="Arial" panose="020B0604020202020204" pitchFamily="34" charset="0"/>
+              <a:buChar char="•"/>
+            </a:pPr>
+            <a:endParaRPr lang="en-US" sz="2800" dirty="0"/>
+          </a:p>
+          <a:p>
+            <a:pPr marL="457200" indent="-457200">
+              <a:buFont typeface="Arial" panose="020B0604020202020204" pitchFamily="34" charset="0"/>
+              <a:buChar char="•"/>
+            </a:pPr>
+            <a:endParaRPr lang="en-US" sz="2800" dirty="0"/>
+          </a:p>
+          <a:p>
+            <a:pPr marL="457200" indent="-457200">
+              <a:buFont typeface="Arial" panose="020B0604020202020204" pitchFamily="34" charset="0"/>
+              <a:buChar char="•"/>
+            </a:pPr>
+            <a:endParaRPr lang="en-US" sz="2800" dirty="0"/>
+          </a:p>
+        </p:txBody>
+      </p:sp>
     </p:spTree>
+  </p:cSld>
+  <p:clrMapOvr>
+    <a:masterClrMapping/>
+  </p:clrMapOvr>
+</p:sld>
+</file>
+
+<file path=ppt/slides/slide2.xml><?xml version="1.0" encoding="utf-8"?>
+<p:sld xmlns:a="http://schemas.openxmlformats.org/drawingml/2006/main" xmlns:r="http://schemas.openxmlformats.org/officeDocument/2006/relationships" xmlns:p="http://schemas.openxmlformats.org/presentationml/2006/main">
+  <p:cSld>
+    <p:bg>
+      <p:bgPr>
+        <a:solidFill>
+          <a:srgbClr val="D9D9D9"/>
+        </a:solidFill>
+        <a:effectLst/>
+      </p:bgPr>
+    </p:bg>
+    <p:spTree>
+      <p:nvGrpSpPr>
+        <p:cNvPr id="1" name=""/>
+        <p:cNvGrpSpPr/>
+        <p:nvPr/>
+      </p:nvGrpSpPr>
+      <p:grpSpPr>
+        <a:xfrm>
+          <a:off x="0" y="0"/>
+          <a:ext cx="0" cy="0"/>
+          <a:chOff x="0" y="0"/>
+          <a:chExt cx="0" cy="0"/>
+        </a:xfrm>
+      </p:grpSpPr>
+      <p:grpSp>
+        <p:nvGrpSpPr>
+          <p:cNvPr id="56" name="Group 8">
+            <a:extLst>
+              <a:ext uri="{FF2B5EF4-FFF2-40B4-BE49-F238E27FC236}">
+                <a16:creationId xmlns:a16="http://schemas.microsoft.com/office/drawing/2014/main" id="{09CE4599-1213-4798-8930-6A42A25F5801}"/>
+              </a:ext>
+            </a:extLst>
+          </p:cNvPr>
+          <p:cNvGrpSpPr>
+            <a:grpSpLocks/>
+          </p:cNvGrpSpPr>
+          <p:nvPr/>
+        </p:nvGrpSpPr>
+        <p:grpSpPr bwMode="auto">
+          <a:xfrm>
+            <a:off x="26349248" y="17724864"/>
+            <a:ext cx="6218237" cy="3839737"/>
+            <a:chOff x="411163" y="4511675"/>
+            <a:chExt cx="12069762" cy="3839740"/>
+          </a:xfrm>
+        </p:grpSpPr>
+        <p:sp>
+          <p:nvSpPr>
+            <p:cNvPr id="57" name="Rounded Rectangle 19">
+              <a:extLst>
+                <a:ext uri="{FF2B5EF4-FFF2-40B4-BE49-F238E27FC236}">
+                  <a16:creationId xmlns:a16="http://schemas.microsoft.com/office/drawing/2014/main" id="{AEDBDAD8-4C29-4B1C-89C8-1CEF50829E89}"/>
+                </a:ext>
+              </a:extLst>
+            </p:cNvPr>
+            <p:cNvSpPr/>
+            <p:nvPr/>
+          </p:nvSpPr>
+          <p:spPr>
+            <a:xfrm>
+              <a:off x="411163" y="4511676"/>
+              <a:ext cx="12069762" cy="3839739"/>
+            </a:xfrm>
+            <a:prstGeom prst="roundRect">
+              <a:avLst>
+                <a:gd name="adj" fmla="val 1218"/>
+              </a:avLst>
+            </a:prstGeom>
+            <a:solidFill>
+              <a:schemeClr val="bg1"/>
+            </a:solidFill>
+            <a:ln w="57150">
+              <a:solidFill>
+                <a:srgbClr val="8C1515"/>
+              </a:solidFill>
+            </a:ln>
+          </p:spPr>
+          <p:style>
+            <a:lnRef idx="2">
+              <a:schemeClr val="accent1">
+                <a:shade val="50000"/>
+              </a:schemeClr>
+            </a:lnRef>
+            <a:fillRef idx="1">
+              <a:schemeClr val="accent1"/>
+            </a:fillRef>
+            <a:effectRef idx="0">
+              <a:schemeClr val="accent1"/>
+            </a:effectRef>
+            <a:fontRef idx="minor">
+              <a:schemeClr val="lt1"/>
+            </a:fontRef>
+          </p:style>
+          <p:txBody>
+            <a:bodyPr lIns="78373" tIns="39187" rIns="78373" bIns="39187" anchor="ctr"/>
+            <a:lstStyle/>
+            <a:p>
+              <a:pPr algn="ctr" defTabSz="3134929" eaLnBrk="1" hangingPunct="1">
+                <a:defRPr/>
+              </a:pPr>
+              <a:endParaRPr kumimoji="0" lang="zh-TW" altLang="en-US">
+                <a:solidFill>
+                  <a:srgbClr val="FFFFFF"/>
+                </a:solidFill>
+                <a:latin typeface="Helvetica" pitchFamily="34" charset="0"/>
+              </a:endParaRPr>
+            </a:p>
+          </p:txBody>
+        </p:sp>
+        <p:sp>
+          <p:nvSpPr>
+            <p:cNvPr id="58" name="Rectangle 57">
+              <a:extLst>
+                <a:ext uri="{FF2B5EF4-FFF2-40B4-BE49-F238E27FC236}">
+                  <a16:creationId xmlns:a16="http://schemas.microsoft.com/office/drawing/2014/main" id="{0CBA8E89-0D4F-4DA5-B707-CA12139F216F}"/>
+                </a:ext>
+              </a:extLst>
+            </p:cNvPr>
+            <p:cNvSpPr/>
+            <p:nvPr/>
+          </p:nvSpPr>
+          <p:spPr>
+            <a:xfrm>
+              <a:off x="411163" y="4511675"/>
+              <a:ext cx="12069762" cy="822961"/>
+            </a:xfrm>
+            <a:prstGeom prst="rect">
+              <a:avLst/>
+            </a:prstGeom>
+            <a:solidFill>
+              <a:srgbClr val="8C1515"/>
+            </a:solidFill>
+            <a:ln>
+              <a:solidFill>
+                <a:srgbClr val="8C1515"/>
+              </a:solidFill>
+            </a:ln>
+          </p:spPr>
+          <p:style>
+            <a:lnRef idx="2">
+              <a:schemeClr val="accent1">
+                <a:shade val="50000"/>
+              </a:schemeClr>
+            </a:lnRef>
+            <a:fillRef idx="1">
+              <a:schemeClr val="accent1"/>
+            </a:fillRef>
+            <a:effectRef idx="0">
+              <a:schemeClr val="accent1"/>
+            </a:effectRef>
+            <a:fontRef idx="minor">
+              <a:schemeClr val="lt1"/>
+            </a:fontRef>
+          </p:style>
+          <p:txBody>
+            <a:bodyPr anchor="ctr"/>
+            <a:lstStyle/>
+            <a:p>
+              <a:pPr algn="ctr" eaLnBrk="1" hangingPunct="1">
+                <a:defRPr/>
+              </a:pPr>
+              <a:r>
+                <a:rPr lang="en-US" sz="5400" b="1" dirty="0">
+                  <a:latin typeface="Helvetica" panose="020B0604020202020204" pitchFamily="34" charset="0"/>
+                  <a:cs typeface="Helvetica" panose="020B0604020202020204" pitchFamily="34" charset="0"/>
+                </a:rPr>
+                <a:t>References</a:t>
+              </a:r>
+            </a:p>
+          </p:txBody>
+        </p:sp>
+      </p:grpSp>
+      <p:grpSp>
+        <p:nvGrpSpPr>
+          <p:cNvPr id="53" name="Group 8">
+            <a:extLst>
+              <a:ext uri="{FF2B5EF4-FFF2-40B4-BE49-F238E27FC236}">
+                <a16:creationId xmlns:a16="http://schemas.microsoft.com/office/drawing/2014/main" id="{726BDA82-6331-452F-A685-FDC556BE84C3}"/>
+              </a:ext>
+            </a:extLst>
+          </p:cNvPr>
+          <p:cNvGrpSpPr>
+            <a:grpSpLocks/>
+          </p:cNvGrpSpPr>
+          <p:nvPr/>
+        </p:nvGrpSpPr>
+        <p:grpSpPr bwMode="auto">
+          <a:xfrm>
+            <a:off x="26289000" y="11121732"/>
+            <a:ext cx="6218237" cy="5851525"/>
+            <a:chOff x="411163" y="4511675"/>
+            <a:chExt cx="12069762" cy="5851529"/>
+          </a:xfrm>
+        </p:grpSpPr>
+        <p:sp>
+          <p:nvSpPr>
+            <p:cNvPr id="54" name="Rounded Rectangle 19">
+              <a:extLst>
+                <a:ext uri="{FF2B5EF4-FFF2-40B4-BE49-F238E27FC236}">
+                  <a16:creationId xmlns:a16="http://schemas.microsoft.com/office/drawing/2014/main" id="{1D5BE9DD-57F7-46CA-B5B7-A8E557E86113}"/>
+                </a:ext>
+              </a:extLst>
+            </p:cNvPr>
+            <p:cNvSpPr/>
+            <p:nvPr/>
+          </p:nvSpPr>
+          <p:spPr>
+            <a:xfrm>
+              <a:off x="411163" y="4511675"/>
+              <a:ext cx="12069762" cy="5851529"/>
+            </a:xfrm>
+            <a:prstGeom prst="roundRect">
+              <a:avLst>
+                <a:gd name="adj" fmla="val 1218"/>
+              </a:avLst>
+            </a:prstGeom>
+            <a:solidFill>
+              <a:schemeClr val="bg1"/>
+            </a:solidFill>
+            <a:ln w="57150">
+              <a:solidFill>
+                <a:srgbClr val="8C1515"/>
+              </a:solidFill>
+            </a:ln>
+          </p:spPr>
+          <p:style>
+            <a:lnRef idx="2">
+              <a:schemeClr val="accent1">
+                <a:shade val="50000"/>
+              </a:schemeClr>
+            </a:lnRef>
+            <a:fillRef idx="1">
+              <a:schemeClr val="accent1"/>
+            </a:fillRef>
+            <a:effectRef idx="0">
+              <a:schemeClr val="accent1"/>
+            </a:effectRef>
+            <a:fontRef idx="minor">
+              <a:schemeClr val="lt1"/>
+            </a:fontRef>
+          </p:style>
+          <p:txBody>
+            <a:bodyPr lIns="78373" tIns="39187" rIns="78373" bIns="39187" anchor="ctr"/>
+            <a:lstStyle/>
+            <a:p>
+              <a:pPr algn="ctr" defTabSz="3134929" eaLnBrk="1" hangingPunct="1">
+                <a:defRPr/>
+              </a:pPr>
+              <a:endParaRPr kumimoji="0" lang="zh-TW" altLang="en-US">
+                <a:solidFill>
+                  <a:srgbClr val="FFFFFF"/>
+                </a:solidFill>
+                <a:latin typeface="Helvetica" pitchFamily="34" charset="0"/>
+              </a:endParaRPr>
+            </a:p>
+          </p:txBody>
+        </p:sp>
+        <p:sp>
+          <p:nvSpPr>
+            <p:cNvPr id="55" name="Rectangle 54">
+              <a:extLst>
+                <a:ext uri="{FF2B5EF4-FFF2-40B4-BE49-F238E27FC236}">
+                  <a16:creationId xmlns:a16="http://schemas.microsoft.com/office/drawing/2014/main" id="{019761E2-4F4F-4C74-8343-CE9CFF655C78}"/>
+                </a:ext>
+              </a:extLst>
+            </p:cNvPr>
+            <p:cNvSpPr/>
+            <p:nvPr/>
+          </p:nvSpPr>
+          <p:spPr>
+            <a:xfrm>
+              <a:off x="411163" y="4511675"/>
+              <a:ext cx="12069762" cy="822961"/>
+            </a:xfrm>
+            <a:prstGeom prst="rect">
+              <a:avLst/>
+            </a:prstGeom>
+            <a:solidFill>
+              <a:srgbClr val="8C1515"/>
+            </a:solidFill>
+            <a:ln>
+              <a:solidFill>
+                <a:srgbClr val="8C1515"/>
+              </a:solidFill>
+            </a:ln>
+          </p:spPr>
+          <p:style>
+            <a:lnRef idx="2">
+              <a:schemeClr val="accent1">
+                <a:shade val="50000"/>
+              </a:schemeClr>
+            </a:lnRef>
+            <a:fillRef idx="1">
+              <a:schemeClr val="accent1"/>
+            </a:fillRef>
+            <a:effectRef idx="0">
+              <a:schemeClr val="accent1"/>
+            </a:effectRef>
+            <a:fontRef idx="minor">
+              <a:schemeClr val="lt1"/>
+            </a:fontRef>
+          </p:style>
+          <p:txBody>
+            <a:bodyPr anchor="ctr"/>
+            <a:lstStyle/>
+            <a:p>
+              <a:pPr algn="ctr" eaLnBrk="1" hangingPunct="1">
+                <a:defRPr/>
+              </a:pPr>
+              <a:r>
+                <a:rPr lang="en-US" sz="5400" b="1" dirty="0">
+                  <a:latin typeface="Helvetica" panose="020B0604020202020204" pitchFamily="34" charset="0"/>
+                  <a:cs typeface="Helvetica" panose="020B0604020202020204" pitchFamily="34" charset="0"/>
+                </a:rPr>
+                <a:t>Future Work</a:t>
+              </a:r>
+            </a:p>
+          </p:txBody>
+        </p:sp>
+      </p:grpSp>
+      <p:grpSp>
+        <p:nvGrpSpPr>
+          <p:cNvPr id="5" name="Group 4">
+            <a:extLst>
+              <a:ext uri="{FF2B5EF4-FFF2-40B4-BE49-F238E27FC236}">
+                <a16:creationId xmlns:a16="http://schemas.microsoft.com/office/drawing/2014/main" id="{9B18C367-A2BD-45AF-B224-92B9698620AC}"/>
+              </a:ext>
+            </a:extLst>
+          </p:cNvPr>
+          <p:cNvGrpSpPr/>
+          <p:nvPr/>
+        </p:nvGrpSpPr>
+        <p:grpSpPr>
+          <a:xfrm>
+            <a:off x="-76200" y="-76200"/>
+            <a:ext cx="33070800" cy="4114800"/>
+            <a:chOff x="-76200" y="0"/>
+            <a:chExt cx="33070800" cy="4038600"/>
+          </a:xfrm>
+          <a:solidFill>
+            <a:srgbClr val="8C1515"/>
+          </a:solidFill>
+        </p:grpSpPr>
+        <p:sp>
+          <p:nvSpPr>
+            <p:cNvPr id="3" name="Rectangle 2">
+              <a:extLst>
+                <a:ext uri="{FF2B5EF4-FFF2-40B4-BE49-F238E27FC236}">
+                  <a16:creationId xmlns:a16="http://schemas.microsoft.com/office/drawing/2014/main" id="{A3A51575-6E00-4923-BEDE-620C6B438E92}"/>
+                </a:ext>
+              </a:extLst>
+            </p:cNvPr>
+            <p:cNvSpPr/>
+            <p:nvPr/>
+          </p:nvSpPr>
+          <p:spPr>
+            <a:xfrm>
+              <a:off x="-76200" y="0"/>
+              <a:ext cx="33070800" cy="4022725"/>
+            </a:xfrm>
+            <a:prstGeom prst="rect">
+              <a:avLst/>
+            </a:prstGeom>
+            <a:grpFill/>
+            <a:ln>
+              <a:solidFill>
+                <a:schemeClr val="bg1"/>
+              </a:solidFill>
+            </a:ln>
+          </p:spPr>
+          <p:style>
+            <a:lnRef idx="2">
+              <a:schemeClr val="accent1">
+                <a:shade val="50000"/>
+              </a:schemeClr>
+            </a:lnRef>
+            <a:fillRef idx="1">
+              <a:schemeClr val="accent1"/>
+            </a:fillRef>
+            <a:effectRef idx="0">
+              <a:schemeClr val="accent1"/>
+            </a:effectRef>
+            <a:fontRef idx="minor">
+              <a:schemeClr val="lt1"/>
+            </a:fontRef>
+          </p:style>
+          <p:txBody>
+            <a:bodyPr lIns="78373" tIns="39187" rIns="78373" bIns="39187" anchor="ctr"/>
+            <a:lstStyle/>
+            <a:p>
+              <a:pPr algn="ctr" defTabSz="3134929" eaLnBrk="1" hangingPunct="1">
+                <a:defRPr/>
+              </a:pPr>
+              <a:r>
+                <a:rPr kumimoji="0" lang="en-US" altLang="zh-TW" sz="8200" b="1" dirty="0">
+                  <a:solidFill>
+                    <a:srgbClr val="FFFFFF"/>
+                  </a:solidFill>
+                  <a:latin typeface="Helvetica" pitchFamily="34" charset="0"/>
+                </a:rPr>
+                <a:t>Adaptive Multi-Agent Path Planning for </a:t>
+              </a:r>
+            </a:p>
+            <a:p>
+              <a:pPr algn="ctr" defTabSz="3134929" eaLnBrk="1" hangingPunct="1">
+                <a:defRPr/>
+              </a:pPr>
+              <a:r>
+                <a:rPr kumimoji="0" lang="en-US" altLang="zh-TW" sz="8200" b="1" dirty="0">
+                  <a:solidFill>
+                    <a:srgbClr val="FFFFFF"/>
+                  </a:solidFill>
+                  <a:latin typeface="Helvetica" pitchFamily="34" charset="0"/>
+                </a:rPr>
+                <a:t>Distributed UAV Systems</a:t>
+              </a:r>
+            </a:p>
+            <a:p>
+              <a:pPr algn="ctr" defTabSz="3134929" eaLnBrk="1" hangingPunct="1">
+                <a:defRPr/>
+              </a:pPr>
+              <a:r>
+                <a:rPr kumimoji="0" lang="en-US" altLang="zh-TW" sz="4400" dirty="0">
+                  <a:solidFill>
+                    <a:srgbClr val="FFFFFF"/>
+                  </a:solidFill>
+                  <a:latin typeface="Helvetica" pitchFamily="34" charset="0"/>
+                </a:rPr>
+                <a:t>Lloyd Maza (</a:t>
+              </a:r>
+              <a:r>
+                <a:rPr kumimoji="0" lang="en-US" altLang="zh-TW" sz="4400" dirty="0" err="1">
+                  <a:solidFill>
+                    <a:srgbClr val="FFFFFF"/>
+                  </a:solidFill>
+                  <a:latin typeface="Helvetica" pitchFamily="34" charset="0"/>
+                </a:rPr>
+                <a:t>lmaza</a:t>
+              </a:r>
+              <a:r>
+                <a:rPr kumimoji="0" lang="en-US" altLang="zh-TW" sz="4400" dirty="0">
+                  <a:solidFill>
+                    <a:srgbClr val="FFFFFF"/>
+                  </a:solidFill>
+                  <a:latin typeface="Helvetica" pitchFamily="34" charset="0"/>
+                </a:rPr>
+                <a:t>) and Cameron McMillan (cmac12)</a:t>
+              </a:r>
+            </a:p>
+            <a:p>
+              <a:pPr algn="ctr" defTabSz="3134929" eaLnBrk="1" hangingPunct="1">
+                <a:defRPr/>
+              </a:pPr>
+              <a:r>
+                <a:rPr kumimoji="0" lang="en-US" altLang="zh-TW" sz="3600" dirty="0">
+                  <a:solidFill>
+                    <a:srgbClr val="FFFFFF"/>
+                  </a:solidFill>
+                  <a:latin typeface="Helvetica" pitchFamily="34" charset="0"/>
+                </a:rPr>
+                <a:t>CS 229 Final Project, Autumn 2017</a:t>
+              </a:r>
+            </a:p>
+          </p:txBody>
+        </p:sp>
+        <p:cxnSp>
+          <p:nvCxnSpPr>
+            <p:cNvPr id="4" name="Straight Connector 3">
+              <a:extLst>
+                <a:ext uri="{FF2B5EF4-FFF2-40B4-BE49-F238E27FC236}">
+                  <a16:creationId xmlns:a16="http://schemas.microsoft.com/office/drawing/2014/main" id="{4FD711F3-E26F-4913-9E69-F6A9B469FBC3}"/>
+                </a:ext>
+              </a:extLst>
+            </p:cNvPr>
+            <p:cNvCxnSpPr>
+              <a:cxnSpLocks/>
+            </p:cNvCxnSpPr>
+            <p:nvPr/>
+          </p:nvCxnSpPr>
+          <p:spPr>
+            <a:xfrm>
+              <a:off x="0" y="4038600"/>
+              <a:ext cx="32918400" cy="0"/>
+            </a:xfrm>
+            <a:prstGeom prst="line">
+              <a:avLst/>
+            </a:prstGeom>
+            <a:grpFill/>
+            <a:ln w="76200">
+              <a:solidFill>
+                <a:schemeClr val="bg1"/>
+              </a:solidFill>
+            </a:ln>
+          </p:spPr>
+          <p:style>
+            <a:lnRef idx="1">
+              <a:schemeClr val="accent1"/>
+            </a:lnRef>
+            <a:fillRef idx="0">
+              <a:schemeClr val="accent1"/>
+            </a:fillRef>
+            <a:effectRef idx="0">
+              <a:schemeClr val="accent1"/>
+            </a:effectRef>
+            <a:fontRef idx="minor">
+              <a:schemeClr val="tx1"/>
+            </a:fontRef>
+          </p:style>
+        </p:cxnSp>
+      </p:grpSp>
+      <p:grpSp>
+        <p:nvGrpSpPr>
+          <p:cNvPr id="3075" name="Group 8">
+            <a:extLst>
+              <a:ext uri="{FF2B5EF4-FFF2-40B4-BE49-F238E27FC236}">
+                <a16:creationId xmlns:a16="http://schemas.microsoft.com/office/drawing/2014/main" id="{E92E9263-7503-4605-9BD9-A43C77EF35C6}"/>
+              </a:ext>
+            </a:extLst>
+          </p:cNvPr>
+          <p:cNvGrpSpPr>
+            <a:grpSpLocks/>
+          </p:cNvGrpSpPr>
+          <p:nvPr/>
+        </p:nvGrpSpPr>
+        <p:grpSpPr bwMode="auto">
+          <a:xfrm>
+            <a:off x="411163" y="4518601"/>
+            <a:ext cx="6218237" cy="5851525"/>
+            <a:chOff x="411163" y="4511675"/>
+            <a:chExt cx="12069762" cy="5851529"/>
+          </a:xfrm>
+        </p:grpSpPr>
+        <p:sp>
+          <p:nvSpPr>
+            <p:cNvPr id="20" name="Rounded Rectangle 19">
+              <a:extLst>
+                <a:ext uri="{FF2B5EF4-FFF2-40B4-BE49-F238E27FC236}">
+                  <a16:creationId xmlns:a16="http://schemas.microsoft.com/office/drawing/2014/main" id="{0A3B8E57-D41B-4440-8CEC-379404F09F8C}"/>
+                </a:ext>
+              </a:extLst>
+            </p:cNvPr>
+            <p:cNvSpPr/>
+            <p:nvPr/>
+          </p:nvSpPr>
+          <p:spPr>
+            <a:xfrm>
+              <a:off x="411163" y="4511675"/>
+              <a:ext cx="12069762" cy="5851529"/>
+            </a:xfrm>
+            <a:prstGeom prst="roundRect">
+              <a:avLst>
+                <a:gd name="adj" fmla="val 1218"/>
+              </a:avLst>
+            </a:prstGeom>
+            <a:solidFill>
+              <a:schemeClr val="bg1"/>
+            </a:solidFill>
+            <a:ln w="57150">
+              <a:solidFill>
+                <a:srgbClr val="8C1515"/>
+              </a:solidFill>
+            </a:ln>
+          </p:spPr>
+          <p:style>
+            <a:lnRef idx="2">
+              <a:schemeClr val="accent1">
+                <a:shade val="50000"/>
+              </a:schemeClr>
+            </a:lnRef>
+            <a:fillRef idx="1">
+              <a:schemeClr val="accent1"/>
+            </a:fillRef>
+            <a:effectRef idx="0">
+              <a:schemeClr val="accent1"/>
+            </a:effectRef>
+            <a:fontRef idx="minor">
+              <a:schemeClr val="lt1"/>
+            </a:fontRef>
+          </p:style>
+          <p:txBody>
+            <a:bodyPr lIns="78373" tIns="39187" rIns="78373" bIns="39187" anchor="ctr"/>
+            <a:lstStyle/>
+            <a:p>
+              <a:pPr algn="ctr" defTabSz="3134929" eaLnBrk="1" hangingPunct="1">
+                <a:defRPr/>
+              </a:pPr>
+              <a:endParaRPr kumimoji="0" lang="zh-TW" altLang="en-US">
+                <a:solidFill>
+                  <a:srgbClr val="FFFFFF"/>
+                </a:solidFill>
+                <a:latin typeface="Helvetica" pitchFamily="34" charset="0"/>
+              </a:endParaRPr>
+            </a:p>
+          </p:txBody>
+        </p:sp>
+        <p:sp>
+          <p:nvSpPr>
+            <p:cNvPr id="6" name="Rectangle 5">
+              <a:extLst>
+                <a:ext uri="{FF2B5EF4-FFF2-40B4-BE49-F238E27FC236}">
+                  <a16:creationId xmlns:a16="http://schemas.microsoft.com/office/drawing/2014/main" id="{25DDE16B-F54C-41F5-BF74-0C0172E4B289}"/>
+                </a:ext>
+              </a:extLst>
+            </p:cNvPr>
+            <p:cNvSpPr/>
+            <p:nvPr/>
+          </p:nvSpPr>
+          <p:spPr>
+            <a:xfrm>
+              <a:off x="411163" y="4511675"/>
+              <a:ext cx="12069762" cy="822961"/>
+            </a:xfrm>
+            <a:prstGeom prst="rect">
+              <a:avLst/>
+            </a:prstGeom>
+            <a:solidFill>
+              <a:srgbClr val="8C1515"/>
+            </a:solidFill>
+            <a:ln>
+              <a:solidFill>
+                <a:srgbClr val="8C1515"/>
+              </a:solidFill>
+            </a:ln>
+          </p:spPr>
+          <p:style>
+            <a:lnRef idx="2">
+              <a:schemeClr val="accent1">
+                <a:shade val="50000"/>
+              </a:schemeClr>
+            </a:lnRef>
+            <a:fillRef idx="1">
+              <a:schemeClr val="accent1"/>
+            </a:fillRef>
+            <a:effectRef idx="0">
+              <a:schemeClr val="accent1"/>
+            </a:effectRef>
+            <a:fontRef idx="minor">
+              <a:schemeClr val="lt1"/>
+            </a:fontRef>
+          </p:style>
+          <p:txBody>
+            <a:bodyPr anchor="ctr"/>
+            <a:lstStyle/>
+            <a:p>
+              <a:pPr algn="ctr" eaLnBrk="1" hangingPunct="1">
+                <a:defRPr/>
+              </a:pPr>
+              <a:r>
+                <a:rPr lang="en-US" sz="5400" b="1" dirty="0">
+                  <a:latin typeface="Helvetica" panose="020B0604020202020204" pitchFamily="34" charset="0"/>
+                  <a:cs typeface="Helvetica" panose="020B0604020202020204" pitchFamily="34" charset="0"/>
+                </a:rPr>
+                <a:t>Motivation</a:t>
+              </a:r>
+            </a:p>
+          </p:txBody>
+        </p:sp>
+      </p:grpSp>
+      <p:pic>
+        <p:nvPicPr>
+          <p:cNvPr id="3076" name="Picture 7">
+            <a:extLst>
+              <a:ext uri="{FF2B5EF4-FFF2-40B4-BE49-F238E27FC236}">
+                <a16:creationId xmlns:a16="http://schemas.microsoft.com/office/drawing/2014/main" id="{CB1A168E-B12F-4D42-9F52-16024FE6CCBF}"/>
+              </a:ext>
+            </a:extLst>
+          </p:cNvPr>
+          <p:cNvPicPr>
+            <a:picLocks noChangeAspect="1" noChangeArrowheads="1"/>
+          </p:cNvPicPr>
+          <p:nvPr/>
+        </p:nvPicPr>
+        <p:blipFill>
+          <a:blip r:embed="rId3">
+            <a:extLst>
+              <a:ext uri="{28A0092B-C50C-407E-A947-70E740481C1C}">
+                <a14:useLocalDpi xmlns:a14="http://schemas.microsoft.com/office/drawing/2010/main" val="0"/>
+              </a:ext>
+            </a:extLst>
+          </a:blip>
+          <a:srcRect/>
+          <a:stretch>
+            <a:fillRect/>
+          </a:stretch>
+        </p:blipFill>
+        <p:spPr bwMode="auto">
+          <a:xfrm>
+            <a:off x="397308" y="0"/>
+            <a:ext cx="3962400" cy="3962400"/>
+          </a:xfrm>
+          <a:prstGeom prst="rect">
+            <a:avLst/>
+          </a:prstGeom>
+          <a:noFill/>
+          <a:ln>
+            <a:noFill/>
+          </a:ln>
+          <a:extLst>
+            <a:ext uri="{909E8E84-426E-40DD-AFC4-6F175D3DCCD1}">
+              <a14:hiddenFill xmlns:a14="http://schemas.microsoft.com/office/drawing/2010/main">
+                <a:solidFill>
+                  <a:srgbClr val="FFFFFF"/>
+                </a:solidFill>
+              </a14:hiddenFill>
+            </a:ext>
+            <a:ext uri="{91240B29-F687-4F45-9708-019B960494DF}">
+              <a14:hiddenLine xmlns:a14="http://schemas.microsoft.com/office/drawing/2010/main" w="9525">
+                <a:solidFill>
+                  <a:srgbClr val="000000"/>
+                </a:solidFill>
+                <a:miter lim="800000"/>
+                <a:headEnd/>
+                <a:tailEnd/>
+              </a14:hiddenLine>
+            </a:ext>
+          </a:extLst>
+        </p:spPr>
+      </p:pic>
+      <p:pic>
+        <p:nvPicPr>
+          <p:cNvPr id="7" name="Picture 6">
+            <a:extLst>
+              <a:ext uri="{FF2B5EF4-FFF2-40B4-BE49-F238E27FC236}">
+                <a16:creationId xmlns:a16="http://schemas.microsoft.com/office/drawing/2014/main" id="{D98CAD94-D63C-4685-8190-ECA01BA5C312}"/>
+              </a:ext>
+            </a:extLst>
+          </p:cNvPr>
+          <p:cNvPicPr>
+            <a:picLocks noChangeAspect="1"/>
+          </p:cNvPicPr>
+          <p:nvPr/>
+        </p:nvPicPr>
+        <p:blipFill>
+          <a:blip r:embed="rId4">
+            <a:extLst>
+              <a:ext uri="{28A0092B-C50C-407E-A947-70E740481C1C}">
+                <a14:useLocalDpi xmlns:a14="http://schemas.microsoft.com/office/drawing/2010/main" val="0"/>
+              </a:ext>
+            </a:extLst>
+          </a:blip>
+          <a:stretch>
+            <a:fillRect/>
+          </a:stretch>
+        </p:blipFill>
+        <p:spPr>
+          <a:xfrm>
+            <a:off x="27326558" y="375138"/>
+            <a:ext cx="5568396" cy="3129248"/>
+          </a:xfrm>
+          <a:prstGeom prst="rect">
+            <a:avLst/>
+          </a:prstGeom>
+        </p:spPr>
+      </p:pic>
+      <p:grpSp>
+        <p:nvGrpSpPr>
+          <p:cNvPr id="35" name="Group 8">
+            <a:extLst>
+              <a:ext uri="{FF2B5EF4-FFF2-40B4-BE49-F238E27FC236}">
+                <a16:creationId xmlns:a16="http://schemas.microsoft.com/office/drawing/2014/main" id="{22EF2B2B-77A7-49C9-91B6-5D20E609C6B9}"/>
+              </a:ext>
+            </a:extLst>
+          </p:cNvPr>
+          <p:cNvGrpSpPr>
+            <a:grpSpLocks/>
+          </p:cNvGrpSpPr>
+          <p:nvPr/>
+        </p:nvGrpSpPr>
+        <p:grpSpPr bwMode="auto">
+          <a:xfrm>
+            <a:off x="411163" y="10972800"/>
+            <a:ext cx="6218237" cy="10591800"/>
+            <a:chOff x="411163" y="4511675"/>
+            <a:chExt cx="12069762" cy="10591807"/>
+          </a:xfrm>
+        </p:grpSpPr>
+        <p:sp>
+          <p:nvSpPr>
+            <p:cNvPr id="38" name="Rounded Rectangle 19">
+              <a:extLst>
+                <a:ext uri="{FF2B5EF4-FFF2-40B4-BE49-F238E27FC236}">
+                  <a16:creationId xmlns:a16="http://schemas.microsoft.com/office/drawing/2014/main" id="{D4C3C0B0-9697-407B-8FC2-259F5A34C1C1}"/>
+                </a:ext>
+              </a:extLst>
+            </p:cNvPr>
+            <p:cNvSpPr/>
+            <p:nvPr/>
+          </p:nvSpPr>
+          <p:spPr>
+            <a:xfrm>
+              <a:off x="411163" y="4511675"/>
+              <a:ext cx="12069762" cy="10591807"/>
+            </a:xfrm>
+            <a:prstGeom prst="roundRect">
+              <a:avLst>
+                <a:gd name="adj" fmla="val 1218"/>
+              </a:avLst>
+            </a:prstGeom>
+            <a:solidFill>
+              <a:schemeClr val="bg1"/>
+            </a:solidFill>
+            <a:ln w="57150">
+              <a:solidFill>
+                <a:srgbClr val="8C1515"/>
+              </a:solidFill>
+            </a:ln>
+          </p:spPr>
+          <p:style>
+            <a:lnRef idx="2">
+              <a:schemeClr val="accent1">
+                <a:shade val="50000"/>
+              </a:schemeClr>
+            </a:lnRef>
+            <a:fillRef idx="1">
+              <a:schemeClr val="accent1"/>
+            </a:fillRef>
+            <a:effectRef idx="0">
+              <a:schemeClr val="accent1"/>
+            </a:effectRef>
+            <a:fontRef idx="minor">
+              <a:schemeClr val="lt1"/>
+            </a:fontRef>
+          </p:style>
+          <p:txBody>
+            <a:bodyPr lIns="78373" tIns="39187" rIns="78373" bIns="39187" anchor="ctr"/>
+            <a:lstStyle/>
+            <a:p>
+              <a:pPr algn="ctr" defTabSz="3134929" eaLnBrk="1" hangingPunct="1">
+                <a:defRPr/>
+              </a:pPr>
+              <a:endParaRPr kumimoji="0" lang="zh-TW" altLang="en-US">
+                <a:solidFill>
+                  <a:srgbClr val="FFFFFF"/>
+                </a:solidFill>
+                <a:latin typeface="Helvetica" pitchFamily="34" charset="0"/>
+              </a:endParaRPr>
+            </a:p>
+          </p:txBody>
+        </p:sp>
+        <p:sp>
+          <p:nvSpPr>
+            <p:cNvPr id="41" name="Rectangle 40">
+              <a:extLst>
+                <a:ext uri="{FF2B5EF4-FFF2-40B4-BE49-F238E27FC236}">
+                  <a16:creationId xmlns:a16="http://schemas.microsoft.com/office/drawing/2014/main" id="{B4023546-5E04-4F3A-9FC6-DD50DDC0F4E4}"/>
+                </a:ext>
+              </a:extLst>
+            </p:cNvPr>
+            <p:cNvSpPr/>
+            <p:nvPr/>
+          </p:nvSpPr>
+          <p:spPr>
+            <a:xfrm>
+              <a:off x="411163" y="4511675"/>
+              <a:ext cx="12069762" cy="822961"/>
+            </a:xfrm>
+            <a:prstGeom prst="rect">
+              <a:avLst/>
+            </a:prstGeom>
+            <a:solidFill>
+              <a:srgbClr val="8C1515"/>
+            </a:solidFill>
+            <a:ln>
+              <a:solidFill>
+                <a:srgbClr val="8C1515"/>
+              </a:solidFill>
+            </a:ln>
+          </p:spPr>
+          <p:style>
+            <a:lnRef idx="2">
+              <a:schemeClr val="accent1">
+                <a:shade val="50000"/>
+              </a:schemeClr>
+            </a:lnRef>
+            <a:fillRef idx="1">
+              <a:schemeClr val="accent1"/>
+            </a:fillRef>
+            <a:effectRef idx="0">
+              <a:schemeClr val="accent1"/>
+            </a:effectRef>
+            <a:fontRef idx="minor">
+              <a:schemeClr val="lt1"/>
+            </a:fontRef>
+          </p:style>
+          <p:txBody>
+            <a:bodyPr anchor="ctr"/>
+            <a:lstStyle/>
+            <a:p>
+              <a:pPr algn="ctr" eaLnBrk="1" hangingPunct="1">
+                <a:defRPr/>
+              </a:pPr>
+              <a:r>
+                <a:rPr lang="en-US" sz="5400" b="1" dirty="0">
+                  <a:latin typeface="Helvetica" panose="020B0604020202020204" pitchFamily="34" charset="0"/>
+                  <a:cs typeface="Helvetica" panose="020B0604020202020204" pitchFamily="34" charset="0"/>
+                </a:rPr>
+                <a:t>Scenario</a:t>
+              </a:r>
+            </a:p>
+          </p:txBody>
+        </p:sp>
+      </p:grpSp>
+      <p:grpSp>
+        <p:nvGrpSpPr>
+          <p:cNvPr id="44" name="Group 8">
+            <a:extLst>
+              <a:ext uri="{FF2B5EF4-FFF2-40B4-BE49-F238E27FC236}">
+                <a16:creationId xmlns:a16="http://schemas.microsoft.com/office/drawing/2014/main" id="{F2D323EA-E4AC-495D-8569-8E5839B52058}"/>
+              </a:ext>
+            </a:extLst>
+          </p:cNvPr>
+          <p:cNvGrpSpPr>
+            <a:grpSpLocks/>
+          </p:cNvGrpSpPr>
+          <p:nvPr/>
+        </p:nvGrpSpPr>
+        <p:grpSpPr bwMode="auto">
+          <a:xfrm>
+            <a:off x="7239000" y="4518601"/>
+            <a:ext cx="18440400" cy="4930199"/>
+            <a:chOff x="411163" y="4511674"/>
+            <a:chExt cx="12069762" cy="5851530"/>
+          </a:xfrm>
+        </p:grpSpPr>
+        <p:sp>
+          <p:nvSpPr>
+            <p:cNvPr id="45" name="Rounded Rectangle 19">
+              <a:extLst>
+                <a:ext uri="{FF2B5EF4-FFF2-40B4-BE49-F238E27FC236}">
+                  <a16:creationId xmlns:a16="http://schemas.microsoft.com/office/drawing/2014/main" id="{8D82BFA8-4B72-4475-8AD8-16B70DF4168C}"/>
+                </a:ext>
+              </a:extLst>
+            </p:cNvPr>
+            <p:cNvSpPr/>
+            <p:nvPr/>
+          </p:nvSpPr>
+          <p:spPr>
+            <a:xfrm>
+              <a:off x="411163" y="4511675"/>
+              <a:ext cx="12069762" cy="5851529"/>
+            </a:xfrm>
+            <a:prstGeom prst="roundRect">
+              <a:avLst>
+                <a:gd name="adj" fmla="val 1218"/>
+              </a:avLst>
+            </a:prstGeom>
+            <a:solidFill>
+              <a:schemeClr val="bg1"/>
+            </a:solidFill>
+            <a:ln w="57150">
+              <a:solidFill>
+                <a:srgbClr val="8C1515"/>
+              </a:solidFill>
+            </a:ln>
+          </p:spPr>
+          <p:style>
+            <a:lnRef idx="2">
+              <a:schemeClr val="accent1">
+                <a:shade val="50000"/>
+              </a:schemeClr>
+            </a:lnRef>
+            <a:fillRef idx="1">
+              <a:schemeClr val="accent1"/>
+            </a:fillRef>
+            <a:effectRef idx="0">
+              <a:schemeClr val="accent1"/>
+            </a:effectRef>
+            <a:fontRef idx="minor">
+              <a:schemeClr val="lt1"/>
+            </a:fontRef>
+          </p:style>
+          <p:txBody>
+            <a:bodyPr lIns="78373" tIns="39187" rIns="78373" bIns="39187" anchor="ctr"/>
+            <a:lstStyle/>
+            <a:p>
+              <a:pPr algn="ctr" defTabSz="3134929" eaLnBrk="1" hangingPunct="1">
+                <a:defRPr/>
+              </a:pPr>
+              <a:endParaRPr kumimoji="0" lang="zh-TW" altLang="en-US" dirty="0">
+                <a:solidFill>
+                  <a:srgbClr val="FFFFFF"/>
+                </a:solidFill>
+                <a:latin typeface="Helvetica" pitchFamily="34" charset="0"/>
+              </a:endParaRPr>
+            </a:p>
+          </p:txBody>
+        </p:sp>
+        <p:sp>
+          <p:nvSpPr>
+            <p:cNvPr id="46" name="Rectangle 45">
+              <a:extLst>
+                <a:ext uri="{FF2B5EF4-FFF2-40B4-BE49-F238E27FC236}">
+                  <a16:creationId xmlns:a16="http://schemas.microsoft.com/office/drawing/2014/main" id="{0101612C-EF1F-41A4-8C9C-55B331710FE9}"/>
+                </a:ext>
+              </a:extLst>
+            </p:cNvPr>
+            <p:cNvSpPr/>
+            <p:nvPr/>
+          </p:nvSpPr>
+          <p:spPr>
+            <a:xfrm>
+              <a:off x="411163" y="4511674"/>
+              <a:ext cx="12069762" cy="976751"/>
+            </a:xfrm>
+            <a:prstGeom prst="rect">
+              <a:avLst/>
+            </a:prstGeom>
+            <a:solidFill>
+              <a:srgbClr val="8C1515"/>
+            </a:solidFill>
+            <a:ln>
+              <a:solidFill>
+                <a:srgbClr val="8C1515"/>
+              </a:solidFill>
+            </a:ln>
+          </p:spPr>
+          <p:style>
+            <a:lnRef idx="2">
+              <a:schemeClr val="accent1">
+                <a:shade val="50000"/>
+              </a:schemeClr>
+            </a:lnRef>
+            <a:fillRef idx="1">
+              <a:schemeClr val="accent1"/>
+            </a:fillRef>
+            <a:effectRef idx="0">
+              <a:schemeClr val="accent1"/>
+            </a:effectRef>
+            <a:fontRef idx="minor">
+              <a:schemeClr val="lt1"/>
+            </a:fontRef>
+          </p:style>
+          <p:txBody>
+            <a:bodyPr anchor="ctr"/>
+            <a:lstStyle/>
+            <a:p>
+              <a:pPr algn="ctr" eaLnBrk="1" hangingPunct="1">
+                <a:defRPr/>
+              </a:pPr>
+              <a:r>
+                <a:rPr lang="en-US" sz="5400" b="1" dirty="0">
+                  <a:latin typeface="Helvetica" panose="020B0604020202020204" pitchFamily="34" charset="0"/>
+                  <a:cs typeface="Helvetica" panose="020B0604020202020204" pitchFamily="34" charset="0"/>
+                </a:rPr>
+                <a:t>Method</a:t>
+              </a:r>
+            </a:p>
+          </p:txBody>
+        </p:sp>
+      </p:grpSp>
+      <p:grpSp>
+        <p:nvGrpSpPr>
+          <p:cNvPr id="47" name="Group 8">
+            <a:extLst>
+              <a:ext uri="{FF2B5EF4-FFF2-40B4-BE49-F238E27FC236}">
+                <a16:creationId xmlns:a16="http://schemas.microsoft.com/office/drawing/2014/main" id="{4625DB9A-6A7E-4D34-8373-26699173C6BB}"/>
+              </a:ext>
+            </a:extLst>
+          </p:cNvPr>
+          <p:cNvGrpSpPr>
+            <a:grpSpLocks/>
+          </p:cNvGrpSpPr>
+          <p:nvPr/>
+        </p:nvGrpSpPr>
+        <p:grpSpPr bwMode="auto">
+          <a:xfrm>
+            <a:off x="7239000" y="10058399"/>
+            <a:ext cx="18440400" cy="11506201"/>
+            <a:chOff x="411163" y="4511674"/>
+            <a:chExt cx="12069762" cy="13656423"/>
+          </a:xfrm>
+        </p:grpSpPr>
+        <p:sp>
+          <p:nvSpPr>
+            <p:cNvPr id="48" name="Rounded Rectangle 19">
+              <a:extLst>
+                <a:ext uri="{FF2B5EF4-FFF2-40B4-BE49-F238E27FC236}">
+                  <a16:creationId xmlns:a16="http://schemas.microsoft.com/office/drawing/2014/main" id="{ACA7F6EB-990E-4BBA-87F0-2DCCC42A0050}"/>
+                </a:ext>
+              </a:extLst>
+            </p:cNvPr>
+            <p:cNvSpPr/>
+            <p:nvPr/>
+          </p:nvSpPr>
+          <p:spPr>
+            <a:xfrm>
+              <a:off x="411163" y="4511675"/>
+              <a:ext cx="12069762" cy="13656422"/>
+            </a:xfrm>
+            <a:prstGeom prst="roundRect">
+              <a:avLst>
+                <a:gd name="adj" fmla="val 315"/>
+              </a:avLst>
+            </a:prstGeom>
+            <a:solidFill>
+              <a:schemeClr val="bg1"/>
+            </a:solidFill>
+            <a:ln w="57150">
+              <a:solidFill>
+                <a:srgbClr val="8C1515"/>
+              </a:solidFill>
+            </a:ln>
+          </p:spPr>
+          <p:style>
+            <a:lnRef idx="2">
+              <a:schemeClr val="accent1">
+                <a:shade val="50000"/>
+              </a:schemeClr>
+            </a:lnRef>
+            <a:fillRef idx="1">
+              <a:schemeClr val="accent1"/>
+            </a:fillRef>
+            <a:effectRef idx="0">
+              <a:schemeClr val="accent1"/>
+            </a:effectRef>
+            <a:fontRef idx="minor">
+              <a:schemeClr val="lt1"/>
+            </a:fontRef>
+          </p:style>
+          <p:txBody>
+            <a:bodyPr lIns="78373" tIns="39187" rIns="78373" bIns="39187" anchor="ctr"/>
+            <a:lstStyle/>
+            <a:p>
+              <a:pPr algn="ctr" defTabSz="3134929" eaLnBrk="1" hangingPunct="1">
+                <a:defRPr/>
+              </a:pPr>
+              <a:endParaRPr kumimoji="0" lang="zh-TW" altLang="en-US">
+                <a:solidFill>
+                  <a:srgbClr val="FFFFFF"/>
+                </a:solidFill>
+                <a:latin typeface="Helvetica" pitchFamily="34" charset="0"/>
+              </a:endParaRPr>
+            </a:p>
+          </p:txBody>
+        </p:sp>
+        <p:sp>
+          <p:nvSpPr>
+            <p:cNvPr id="49" name="Rectangle: Top Corners Rounded 48">
+              <a:extLst>
+                <a:ext uri="{FF2B5EF4-FFF2-40B4-BE49-F238E27FC236}">
+                  <a16:creationId xmlns:a16="http://schemas.microsoft.com/office/drawing/2014/main" id="{6ACAA0F7-FF90-498B-A16C-692290C2CE6D}"/>
+                </a:ext>
+              </a:extLst>
+            </p:cNvPr>
+            <p:cNvSpPr/>
+            <p:nvPr/>
+          </p:nvSpPr>
+          <p:spPr>
+            <a:xfrm>
+              <a:off x="411163" y="4511674"/>
+              <a:ext cx="12069762" cy="976751"/>
+            </a:xfrm>
+            <a:prstGeom prst="round2SameRect">
+              <a:avLst/>
+            </a:prstGeom>
+            <a:solidFill>
+              <a:srgbClr val="8C1515"/>
+            </a:solidFill>
+            <a:ln>
+              <a:solidFill>
+                <a:srgbClr val="8C1515"/>
+              </a:solidFill>
+            </a:ln>
+          </p:spPr>
+          <p:style>
+            <a:lnRef idx="2">
+              <a:schemeClr val="accent1">
+                <a:shade val="50000"/>
+              </a:schemeClr>
+            </a:lnRef>
+            <a:fillRef idx="1">
+              <a:schemeClr val="accent1"/>
+            </a:fillRef>
+            <a:effectRef idx="0">
+              <a:schemeClr val="accent1"/>
+            </a:effectRef>
+            <a:fontRef idx="minor">
+              <a:schemeClr val="lt1"/>
+            </a:fontRef>
+          </p:style>
+          <p:txBody>
+            <a:bodyPr anchor="ctr"/>
+            <a:lstStyle/>
+            <a:p>
+              <a:pPr algn="ctr" eaLnBrk="1" hangingPunct="1">
+                <a:defRPr/>
+              </a:pPr>
+              <a:r>
+                <a:rPr lang="en-US" sz="5400" b="1" dirty="0">
+                  <a:latin typeface="Helvetica" panose="020B0604020202020204" pitchFamily="34" charset="0"/>
+                  <a:cs typeface="Helvetica" panose="020B0604020202020204" pitchFamily="34" charset="0"/>
+                </a:rPr>
+                <a:t>Results</a:t>
+              </a:r>
+            </a:p>
+          </p:txBody>
+        </p:sp>
+      </p:grpSp>
+      <p:grpSp>
+        <p:nvGrpSpPr>
+          <p:cNvPr id="50" name="Group 8">
+            <a:extLst>
+              <a:ext uri="{FF2B5EF4-FFF2-40B4-BE49-F238E27FC236}">
+                <a16:creationId xmlns:a16="http://schemas.microsoft.com/office/drawing/2014/main" id="{5604D54E-F7AA-4282-B970-8C59FFDC48E9}"/>
+              </a:ext>
+            </a:extLst>
+          </p:cNvPr>
+          <p:cNvGrpSpPr>
+            <a:grpSpLocks/>
+          </p:cNvGrpSpPr>
+          <p:nvPr/>
+        </p:nvGrpSpPr>
+        <p:grpSpPr bwMode="auto">
+          <a:xfrm>
+            <a:off x="26292464" y="4518600"/>
+            <a:ext cx="6218237" cy="5851525"/>
+            <a:chOff x="411163" y="4511675"/>
+            <a:chExt cx="12069762" cy="5851529"/>
+          </a:xfrm>
+        </p:grpSpPr>
+        <p:sp>
+          <p:nvSpPr>
+            <p:cNvPr id="51" name="Rounded Rectangle 19">
+              <a:extLst>
+                <a:ext uri="{FF2B5EF4-FFF2-40B4-BE49-F238E27FC236}">
+                  <a16:creationId xmlns:a16="http://schemas.microsoft.com/office/drawing/2014/main" id="{65576BDE-7830-4DC9-AE2C-25B0A6C5076D}"/>
+                </a:ext>
+              </a:extLst>
+            </p:cNvPr>
+            <p:cNvSpPr/>
+            <p:nvPr/>
+          </p:nvSpPr>
+          <p:spPr>
+            <a:xfrm>
+              <a:off x="411163" y="4511675"/>
+              <a:ext cx="12069762" cy="5851529"/>
+            </a:xfrm>
+            <a:prstGeom prst="roundRect">
+              <a:avLst>
+                <a:gd name="adj" fmla="val 1218"/>
+              </a:avLst>
+            </a:prstGeom>
+            <a:solidFill>
+              <a:schemeClr val="bg1"/>
+            </a:solidFill>
+            <a:ln w="57150">
+              <a:solidFill>
+                <a:srgbClr val="8C1515"/>
+              </a:solidFill>
+            </a:ln>
+          </p:spPr>
+          <p:style>
+            <a:lnRef idx="2">
+              <a:schemeClr val="accent1">
+                <a:shade val="50000"/>
+              </a:schemeClr>
+            </a:lnRef>
+            <a:fillRef idx="1">
+              <a:schemeClr val="accent1"/>
+            </a:fillRef>
+            <a:effectRef idx="0">
+              <a:schemeClr val="accent1"/>
+            </a:effectRef>
+            <a:fontRef idx="minor">
+              <a:schemeClr val="lt1"/>
+            </a:fontRef>
+          </p:style>
+          <p:txBody>
+            <a:bodyPr lIns="78373" tIns="39187" rIns="78373" bIns="39187" anchor="ctr"/>
+            <a:lstStyle/>
+            <a:p>
+              <a:pPr algn="ctr" defTabSz="3134929" eaLnBrk="1" hangingPunct="1">
+                <a:defRPr/>
+              </a:pPr>
+              <a:endParaRPr kumimoji="0" lang="zh-TW" altLang="en-US">
+                <a:solidFill>
+                  <a:srgbClr val="FFFFFF"/>
+                </a:solidFill>
+                <a:latin typeface="Helvetica" pitchFamily="34" charset="0"/>
+              </a:endParaRPr>
+            </a:p>
+          </p:txBody>
+        </p:sp>
+        <p:sp>
+          <p:nvSpPr>
+            <p:cNvPr id="52" name="Rectangle 51">
+              <a:extLst>
+                <a:ext uri="{FF2B5EF4-FFF2-40B4-BE49-F238E27FC236}">
+                  <a16:creationId xmlns:a16="http://schemas.microsoft.com/office/drawing/2014/main" id="{47FF2CA4-6880-4125-8BCF-7FAFAF19E741}"/>
+                </a:ext>
+              </a:extLst>
+            </p:cNvPr>
+            <p:cNvSpPr/>
+            <p:nvPr/>
+          </p:nvSpPr>
+          <p:spPr>
+            <a:xfrm>
+              <a:off x="411163" y="4511675"/>
+              <a:ext cx="12069762" cy="822961"/>
+            </a:xfrm>
+            <a:prstGeom prst="rect">
+              <a:avLst/>
+            </a:prstGeom>
+            <a:solidFill>
+              <a:srgbClr val="8C1515"/>
+            </a:solidFill>
+            <a:ln>
+              <a:solidFill>
+                <a:srgbClr val="8C1515"/>
+              </a:solidFill>
+            </a:ln>
+          </p:spPr>
+          <p:style>
+            <a:lnRef idx="2">
+              <a:schemeClr val="accent1">
+                <a:shade val="50000"/>
+              </a:schemeClr>
+            </a:lnRef>
+            <a:fillRef idx="1">
+              <a:schemeClr val="accent1"/>
+            </a:fillRef>
+            <a:effectRef idx="0">
+              <a:schemeClr val="accent1"/>
+            </a:effectRef>
+            <a:fontRef idx="minor">
+              <a:schemeClr val="lt1"/>
+            </a:fontRef>
+          </p:style>
+          <p:txBody>
+            <a:bodyPr anchor="ctr"/>
+            <a:lstStyle/>
+            <a:p>
+              <a:pPr algn="ctr" eaLnBrk="1" hangingPunct="1">
+                <a:defRPr/>
+              </a:pPr>
+              <a:r>
+                <a:rPr lang="en-US" sz="5400" b="1" dirty="0">
+                  <a:latin typeface="Helvetica" panose="020B0604020202020204" pitchFamily="34" charset="0"/>
+                  <a:cs typeface="Helvetica" panose="020B0604020202020204" pitchFamily="34" charset="0"/>
+                </a:rPr>
+                <a:t>Conclusions</a:t>
+              </a:r>
+            </a:p>
+          </p:txBody>
+        </p:sp>
+      </p:grpSp>
+      <p:sp>
+        <p:nvSpPr>
+          <p:cNvPr id="2" name="TextBox 1">
+            <a:extLst>
+              <a:ext uri="{FF2B5EF4-FFF2-40B4-BE49-F238E27FC236}">
+                <a16:creationId xmlns:a16="http://schemas.microsoft.com/office/drawing/2014/main" id="{338D7249-1CDB-4EC5-A3B0-24312DBBDE1B}"/>
+              </a:ext>
+            </a:extLst>
+          </p:cNvPr>
+          <p:cNvSpPr txBox="1"/>
+          <p:nvPr/>
+        </p:nvSpPr>
+        <p:spPr>
+          <a:xfrm>
+            <a:off x="7467600" y="5715000"/>
+            <a:ext cx="6400800" cy="3185487"/>
+          </a:xfrm>
+          <a:prstGeom prst="rect">
+            <a:avLst/>
+          </a:prstGeom>
+          <a:noFill/>
+        </p:spPr>
+        <p:txBody>
+          <a:bodyPr wrap="square" rtlCol="0">
+            <a:spAutoFit/>
+          </a:bodyPr>
+          <a:lstStyle/>
+          <a:p>
+            <a:pPr algn="ctr">
+              <a:spcAft>
+                <a:spcPts val="600"/>
+              </a:spcAft>
+            </a:pPr>
+            <a:r>
+              <a:rPr lang="en-US" sz="2800" b="1" dirty="0"/>
+              <a:t>Cooperative and Geometric Learning Algorithm (CGLA) </a:t>
+            </a:r>
+            <a:r>
+              <a:rPr lang="en-US" sz="2800" b="1" baseline="30000" dirty="0"/>
+              <a:t>[2]</a:t>
+            </a:r>
+            <a:endParaRPr lang="en-US" sz="2800" b="1" dirty="0"/>
+          </a:p>
+          <a:p>
+            <a:pPr marL="571500" indent="-571500">
+              <a:buFont typeface="Arial" panose="020B0604020202020204" pitchFamily="34" charset="0"/>
+              <a:buChar char="•"/>
+            </a:pPr>
+            <a:r>
+              <a:rPr lang="en-US" sz="2800" dirty="0"/>
+              <a:t>Offshoot of Q-learning</a:t>
+            </a:r>
+          </a:p>
+          <a:p>
+            <a:pPr marL="571500" indent="-571500">
+              <a:buFont typeface="Arial" panose="020B0604020202020204" pitchFamily="34" charset="0"/>
+              <a:buChar char="•"/>
+            </a:pPr>
+            <a:r>
+              <a:rPr lang="en-US" sz="2800" dirty="0"/>
+              <a:t>Balance between minimizing path length and minimizing risk</a:t>
+            </a:r>
+          </a:p>
+          <a:p>
+            <a:pPr marL="571500" indent="-571500">
+              <a:buFont typeface="Arial" panose="020B0604020202020204" pitchFamily="34" charset="0"/>
+              <a:buChar char="•"/>
+            </a:pPr>
+            <a:r>
+              <a:rPr lang="en-US" sz="2800" dirty="0"/>
+              <a:t>Simplifies information sharing between agents</a:t>
+            </a:r>
+          </a:p>
+        </p:txBody>
+      </p:sp>
+      <p:grpSp>
+        <p:nvGrpSpPr>
+          <p:cNvPr id="11" name="Group 10">
+            <a:extLst>
+              <a:ext uri="{FF2B5EF4-FFF2-40B4-BE49-F238E27FC236}">
+                <a16:creationId xmlns:a16="http://schemas.microsoft.com/office/drawing/2014/main" id="{FD2A0240-1230-4E0C-A6A1-12C1F090E20D}"/>
+              </a:ext>
+            </a:extLst>
+          </p:cNvPr>
+          <p:cNvGrpSpPr/>
+          <p:nvPr/>
+        </p:nvGrpSpPr>
+        <p:grpSpPr>
+          <a:xfrm>
+            <a:off x="13639800" y="5402282"/>
+            <a:ext cx="5257800" cy="3970318"/>
+            <a:chOff x="13639800" y="5402282"/>
+            <a:chExt cx="5257800" cy="3970318"/>
+          </a:xfrm>
+        </p:grpSpPr>
+        <p:sp>
+          <p:nvSpPr>
+            <p:cNvPr id="29" name="TextBox 28">
+              <a:extLst>
+                <a:ext uri="{FF2B5EF4-FFF2-40B4-BE49-F238E27FC236}">
+                  <a16:creationId xmlns:a16="http://schemas.microsoft.com/office/drawing/2014/main" id="{F6B20CD6-EB3A-4E95-B80E-05FFA89B5739}"/>
+                </a:ext>
+              </a:extLst>
+            </p:cNvPr>
+            <p:cNvSpPr txBox="1"/>
+            <p:nvPr/>
+          </p:nvSpPr>
+          <p:spPr>
+            <a:xfrm>
+              <a:off x="13639800" y="5402282"/>
+              <a:ext cx="5257800" cy="3970318"/>
+            </a:xfrm>
+            <a:prstGeom prst="rect">
+              <a:avLst/>
+            </a:prstGeom>
+            <a:noFill/>
+          </p:spPr>
+          <p:txBody>
+            <a:bodyPr wrap="square" rtlCol="0">
+              <a:spAutoFit/>
+            </a:bodyPr>
+            <a:lstStyle/>
+            <a:p>
+              <a:pPr algn="ctr"/>
+              <a:r>
+                <a:rPr lang="en-US" sz="2800" dirty="0"/>
+                <a:t>Generate </a:t>
+              </a:r>
+              <a:r>
+                <a:rPr lang="en-US" sz="2800" b="1" dirty="0"/>
+                <a:t>risk map</a:t>
+              </a:r>
+              <a:r>
+                <a:rPr lang="en-US" sz="2800" dirty="0"/>
+                <a:t> (A) of the known environment</a:t>
+              </a:r>
+            </a:p>
+            <a:p>
+              <a:pPr algn="ctr"/>
+              <a:endParaRPr lang="en-US" sz="2800" dirty="0"/>
+            </a:p>
+            <a:p>
+              <a:pPr algn="ctr"/>
+              <a:r>
+                <a:rPr lang="en-US" sz="2800" dirty="0"/>
+                <a:t>Generate </a:t>
+              </a:r>
+              <a:r>
+                <a:rPr lang="en-US" sz="2800" b="1" dirty="0"/>
+                <a:t>cost matrix </a:t>
+              </a:r>
+              <a:r>
+                <a:rPr lang="en-US" sz="2800" dirty="0"/>
+                <a:t>(G)</a:t>
+              </a:r>
+            </a:p>
+            <a:p>
+              <a:pPr algn="ctr"/>
+              <a:endParaRPr lang="en-US" sz="2800" dirty="0"/>
+            </a:p>
+            <a:p>
+              <a:pPr algn="ctr"/>
+              <a:r>
+                <a:rPr lang="en-US" sz="2800" dirty="0"/>
+                <a:t>Execute </a:t>
+              </a:r>
+              <a:r>
+                <a:rPr lang="en-US" sz="2800" b="1" dirty="0"/>
+                <a:t>path planning</a:t>
+              </a:r>
+            </a:p>
+            <a:p>
+              <a:pPr algn="ctr"/>
+              <a:endParaRPr lang="en-US" sz="2800" dirty="0"/>
+            </a:p>
+            <a:p>
+              <a:pPr algn="ctr"/>
+              <a:r>
+                <a:rPr lang="en-US" sz="2800" dirty="0"/>
+                <a:t>If an unmodeled threat is discovered, </a:t>
+              </a:r>
+              <a:r>
+                <a:rPr lang="en-US" sz="2800" b="1" dirty="0"/>
+                <a:t>repeat</a:t>
+              </a:r>
+              <a:r>
+                <a:rPr lang="en-US" sz="2800" dirty="0"/>
+                <a:t> from step 1</a:t>
+              </a:r>
+            </a:p>
+          </p:txBody>
+        </p:sp>
+        <p:sp>
+          <p:nvSpPr>
+            <p:cNvPr id="10" name="Arrow: Down 9">
+              <a:extLst>
+                <a:ext uri="{FF2B5EF4-FFF2-40B4-BE49-F238E27FC236}">
+                  <a16:creationId xmlns:a16="http://schemas.microsoft.com/office/drawing/2014/main" id="{E8B6E55A-1B7F-434C-9FC0-F4747B5CAC4C}"/>
+                </a:ext>
+              </a:extLst>
+            </p:cNvPr>
+            <p:cNvSpPr/>
+            <p:nvPr/>
+          </p:nvSpPr>
+          <p:spPr>
+            <a:xfrm>
+              <a:off x="16116300" y="6400800"/>
+              <a:ext cx="304800" cy="228600"/>
+            </a:xfrm>
+            <a:prstGeom prst="downArrow">
+              <a:avLst/>
+            </a:prstGeom>
+            <a:solidFill>
+              <a:srgbClr val="8C1515"/>
+            </a:solidFill>
+            <a:ln>
+              <a:solidFill>
+                <a:srgbClr val="8C1515"/>
+              </a:solidFill>
+            </a:ln>
+          </p:spPr>
+          <p:style>
+            <a:lnRef idx="2">
+              <a:schemeClr val="accent1">
+                <a:shade val="50000"/>
+              </a:schemeClr>
+            </a:lnRef>
+            <a:fillRef idx="1">
+              <a:schemeClr val="accent1"/>
+            </a:fillRef>
+            <a:effectRef idx="0">
+              <a:schemeClr val="accent1"/>
+            </a:effectRef>
+            <a:fontRef idx="minor">
+              <a:schemeClr val="lt1"/>
+            </a:fontRef>
+          </p:style>
+          <p:txBody>
+            <a:bodyPr rtlCol="0" anchor="ctr"/>
+            <a:lstStyle/>
+            <a:p>
+              <a:pPr algn="ctr"/>
+              <a:endParaRPr lang="en-US"/>
+            </a:p>
+          </p:txBody>
+        </p:sp>
+        <p:sp>
+          <p:nvSpPr>
+            <p:cNvPr id="33" name="Arrow: Down 32">
+              <a:extLst>
+                <a:ext uri="{FF2B5EF4-FFF2-40B4-BE49-F238E27FC236}">
+                  <a16:creationId xmlns:a16="http://schemas.microsoft.com/office/drawing/2014/main" id="{0B0A106B-29FA-4F91-8952-E2BE47548AED}"/>
+                </a:ext>
+              </a:extLst>
+            </p:cNvPr>
+            <p:cNvSpPr/>
+            <p:nvPr/>
+          </p:nvSpPr>
+          <p:spPr>
+            <a:xfrm>
+              <a:off x="16116300" y="7273141"/>
+              <a:ext cx="304800" cy="228600"/>
+            </a:xfrm>
+            <a:prstGeom prst="downArrow">
+              <a:avLst/>
+            </a:prstGeom>
+            <a:solidFill>
+              <a:srgbClr val="8C1515"/>
+            </a:solidFill>
+            <a:ln>
+              <a:solidFill>
+                <a:srgbClr val="8C1515"/>
+              </a:solidFill>
+            </a:ln>
+          </p:spPr>
+          <p:style>
+            <a:lnRef idx="2">
+              <a:schemeClr val="accent1">
+                <a:shade val="50000"/>
+              </a:schemeClr>
+            </a:lnRef>
+            <a:fillRef idx="1">
+              <a:schemeClr val="accent1"/>
+            </a:fillRef>
+            <a:effectRef idx="0">
+              <a:schemeClr val="accent1"/>
+            </a:effectRef>
+            <a:fontRef idx="minor">
+              <a:schemeClr val="lt1"/>
+            </a:fontRef>
+          </p:style>
+          <p:txBody>
+            <a:bodyPr rtlCol="0" anchor="ctr"/>
+            <a:lstStyle/>
+            <a:p>
+              <a:pPr algn="ctr"/>
+              <a:endParaRPr lang="en-US"/>
+            </a:p>
+          </p:txBody>
+        </p:sp>
+        <p:sp>
+          <p:nvSpPr>
+            <p:cNvPr id="34" name="Arrow: Down 33">
+              <a:extLst>
+                <a:ext uri="{FF2B5EF4-FFF2-40B4-BE49-F238E27FC236}">
+                  <a16:creationId xmlns:a16="http://schemas.microsoft.com/office/drawing/2014/main" id="{96EF3590-1F8B-493E-AD77-20ADAF50B2D8}"/>
+                </a:ext>
+              </a:extLst>
+            </p:cNvPr>
+            <p:cNvSpPr/>
+            <p:nvPr/>
+          </p:nvSpPr>
+          <p:spPr>
+            <a:xfrm>
+              <a:off x="16116300" y="8145482"/>
+              <a:ext cx="304800" cy="228600"/>
+            </a:xfrm>
+            <a:prstGeom prst="downArrow">
+              <a:avLst/>
+            </a:prstGeom>
+            <a:solidFill>
+              <a:srgbClr val="8C1515"/>
+            </a:solidFill>
+            <a:ln>
+              <a:solidFill>
+                <a:srgbClr val="8C1515"/>
+              </a:solidFill>
+            </a:ln>
+          </p:spPr>
+          <p:style>
+            <a:lnRef idx="2">
+              <a:schemeClr val="accent1">
+                <a:shade val="50000"/>
+              </a:schemeClr>
+            </a:lnRef>
+            <a:fillRef idx="1">
+              <a:schemeClr val="accent1"/>
+            </a:fillRef>
+            <a:effectRef idx="0">
+              <a:schemeClr val="accent1"/>
+            </a:effectRef>
+            <a:fontRef idx="minor">
+              <a:schemeClr val="lt1"/>
+            </a:fontRef>
+          </p:style>
+          <p:txBody>
+            <a:bodyPr rtlCol="0" anchor="ctr"/>
+            <a:lstStyle/>
+            <a:p>
+              <a:pPr algn="ctr"/>
+              <a:endParaRPr lang="en-US"/>
+            </a:p>
+          </p:txBody>
+        </p:sp>
+      </p:grpSp>
+      <mc:AlternateContent xmlns:mc="http://schemas.openxmlformats.org/markup-compatibility/2006" xmlns:a14="http://schemas.microsoft.com/office/drawing/2010/main">
+        <mc:Choice Requires="a14">
+          <p:sp>
+            <p:nvSpPr>
+              <p:cNvPr id="12" name="TextBox 11">
+                <a:extLst>
+                  <a:ext uri="{FF2B5EF4-FFF2-40B4-BE49-F238E27FC236}">
+                    <a16:creationId xmlns:a16="http://schemas.microsoft.com/office/drawing/2014/main" id="{193B745B-79B2-4957-BC4A-FACBF34152E5}"/>
+                  </a:ext>
+                </a:extLst>
+              </p:cNvPr>
+              <p:cNvSpPr txBox="1"/>
+              <p:nvPr/>
+            </p:nvSpPr>
+            <p:spPr>
+              <a:xfrm>
+                <a:off x="19431000" y="5410200"/>
+                <a:ext cx="5852884" cy="1104148"/>
+              </a:xfrm>
+              <a:prstGeom prst="rect">
+                <a:avLst/>
+              </a:prstGeom>
+              <a:noFill/>
+            </p:spPr>
+            <p:txBody>
+              <a:bodyPr wrap="none" lIns="0" tIns="0" rIns="0" bIns="0" rtlCol="0">
+                <a:spAutoFit/>
+              </a:bodyPr>
+              <a:lstStyle/>
+              <a:p>
+                <a:pPr/>
+                <a14:m>
+                  <m:oMathPara xmlns:m="http://schemas.openxmlformats.org/officeDocument/2006/math">
+                    <m:oMathParaPr>
+                      <m:jc m:val="centerGroup"/>
+                    </m:oMathParaPr>
+                    <m:oMath xmlns:m="http://schemas.openxmlformats.org/officeDocument/2006/math">
+                      <m:sSub>
+                        <m:sSubPr>
+                          <m:ctrlPr>
+                            <a:rPr lang="en-US" sz="3200" i="1" smtClean="0">
+                              <a:latin typeface="Cambria Math" panose="02040503050406030204" pitchFamily="18" charset="0"/>
+                            </a:rPr>
+                          </m:ctrlPr>
+                        </m:sSubPr>
+                        <m:e>
+                          <m:r>
+                            <a:rPr lang="en-US" sz="3200" b="0" i="1" smtClean="0">
+                              <a:latin typeface="Cambria Math" panose="02040503050406030204" pitchFamily="18" charset="0"/>
+                            </a:rPr>
+                            <m:t>𝐴</m:t>
+                          </m:r>
+                        </m:e>
+                        <m:sub>
+                          <m:r>
+                            <a:rPr lang="en-US" sz="3200" b="0" i="1" smtClean="0">
+                              <a:latin typeface="Cambria Math" panose="02040503050406030204" pitchFamily="18" charset="0"/>
+                            </a:rPr>
+                            <m:t>1</m:t>
+                          </m:r>
+                          <m:r>
+                            <a:rPr lang="en-US" sz="3200" b="0" i="1" smtClean="0">
+                              <a:latin typeface="Cambria Math" panose="02040503050406030204" pitchFamily="18" charset="0"/>
+                              <a:ea typeface="Cambria Math" panose="02040503050406030204" pitchFamily="18" charset="0"/>
+                            </a:rPr>
+                            <m:t>→2</m:t>
+                          </m:r>
+                        </m:sub>
+                      </m:sSub>
+                      <m:r>
+                        <a:rPr lang="en-US" sz="3200" b="0" i="1" smtClean="0">
+                          <a:latin typeface="Cambria Math" panose="02040503050406030204" pitchFamily="18" charset="0"/>
+                        </a:rPr>
+                        <m:t>=</m:t>
+                      </m:r>
+                      <m:sSub>
+                        <m:sSubPr>
+                          <m:ctrlPr>
+                            <a:rPr lang="en-US" sz="3200" b="0" i="1" smtClean="0">
+                              <a:latin typeface="Cambria Math" panose="02040503050406030204" pitchFamily="18" charset="0"/>
+                            </a:rPr>
+                          </m:ctrlPr>
+                        </m:sSubPr>
+                        <m:e>
+                          <m:r>
+                            <a:rPr lang="en-US" sz="3200" b="0" i="1" smtClean="0">
+                              <a:latin typeface="Cambria Math" panose="02040503050406030204" pitchFamily="18" charset="0"/>
+                            </a:rPr>
+                            <m:t>𝑑</m:t>
+                          </m:r>
+                        </m:e>
+                        <m:sub>
+                          <m:r>
+                            <a:rPr lang="en-US" sz="3200" b="0" i="1" smtClean="0">
+                              <a:latin typeface="Cambria Math" panose="02040503050406030204" pitchFamily="18" charset="0"/>
+                            </a:rPr>
+                            <m:t>1</m:t>
+                          </m:r>
+                          <m:r>
+                            <a:rPr lang="en-US" sz="3200" b="0" i="1" smtClean="0">
+                              <a:latin typeface="Cambria Math" panose="02040503050406030204" pitchFamily="18" charset="0"/>
+                              <a:ea typeface="Cambria Math" panose="02040503050406030204" pitchFamily="18" charset="0"/>
+                            </a:rPr>
+                            <m:t>→2</m:t>
+                          </m:r>
+                        </m:sub>
+                      </m:sSub>
+                      <m:r>
+                        <a:rPr lang="en-US" sz="3200" b="0" i="1" smtClean="0">
+                          <a:latin typeface="Cambria Math" panose="02040503050406030204" pitchFamily="18" charset="0"/>
+                        </a:rPr>
+                        <m:t>+</m:t>
+                      </m:r>
+                      <m:r>
+                        <a:rPr lang="en-US" sz="3200" b="0" i="1" smtClean="0">
+                          <a:latin typeface="Cambria Math" panose="02040503050406030204" pitchFamily="18" charset="0"/>
+                        </a:rPr>
+                        <m:t>𝐾</m:t>
+                      </m:r>
+                      <m:r>
+                        <a:rPr lang="en-US" sz="3200" b="0" i="1" smtClean="0">
+                          <a:latin typeface="Cambria Math" panose="02040503050406030204" pitchFamily="18" charset="0"/>
+                          <a:ea typeface="Cambria Math" panose="02040503050406030204" pitchFamily="18" charset="0"/>
+                        </a:rPr>
+                        <m:t>×</m:t>
+                      </m:r>
+                      <m:nary>
+                        <m:naryPr>
+                          <m:ctrlPr>
+                            <a:rPr lang="en-US" sz="3200" b="0" i="1" smtClean="0">
+                              <a:latin typeface="Cambria Math" panose="02040503050406030204" pitchFamily="18" charset="0"/>
+                              <a:ea typeface="Cambria Math" panose="02040503050406030204" pitchFamily="18" charset="0"/>
+                            </a:rPr>
+                          </m:ctrlPr>
+                        </m:naryPr>
+                        <m:sub>
+                          <m:r>
+                            <m:rPr>
+                              <m:brk m:alnAt="23"/>
+                            </m:rPr>
+                            <a:rPr lang="en-US" sz="3200" b="0" i="1" smtClean="0">
+                              <a:latin typeface="Cambria Math" panose="02040503050406030204" pitchFamily="18" charset="0"/>
+                              <a:ea typeface="Cambria Math" panose="02040503050406030204" pitchFamily="18" charset="0"/>
+                            </a:rPr>
+                            <m:t>1</m:t>
+                          </m:r>
+                        </m:sub>
+                        <m:sup>
+                          <m:r>
+                            <a:rPr lang="en-US" sz="3200" b="0" i="1" smtClean="0">
+                              <a:latin typeface="Cambria Math" panose="02040503050406030204" pitchFamily="18" charset="0"/>
+                              <a:ea typeface="Cambria Math" panose="02040503050406030204" pitchFamily="18" charset="0"/>
+                            </a:rPr>
+                            <m:t>2</m:t>
+                          </m:r>
+                        </m:sup>
+                        <m:e>
+                          <m:r>
+                            <a:rPr lang="en-US" sz="3200" b="0" i="1" smtClean="0">
+                              <a:latin typeface="Cambria Math" panose="02040503050406030204" pitchFamily="18" charset="0"/>
+                              <a:ea typeface="Cambria Math" panose="02040503050406030204" pitchFamily="18" charset="0"/>
+                            </a:rPr>
+                            <m:t>𝐹</m:t>
+                          </m:r>
+                          <m:r>
+                            <a:rPr lang="en-US" sz="3200" b="0" i="1" smtClean="0">
+                              <a:latin typeface="Cambria Math" panose="02040503050406030204" pitchFamily="18" charset="0"/>
+                              <a:ea typeface="Cambria Math" panose="02040503050406030204" pitchFamily="18" charset="0"/>
+                            </a:rPr>
+                            <m:t>(</m:t>
+                          </m:r>
+                          <m:r>
+                            <a:rPr lang="en-US" sz="3200" b="0" i="1" smtClean="0">
+                              <a:latin typeface="Cambria Math" panose="02040503050406030204" pitchFamily="18" charset="0"/>
+                              <a:ea typeface="Cambria Math" panose="02040503050406030204" pitchFamily="18" charset="0"/>
+                            </a:rPr>
+                            <m:t>𝑥</m:t>
+                          </m:r>
+                          <m:r>
+                            <a:rPr lang="en-US" sz="3200" b="0" i="1" smtClean="0">
+                              <a:latin typeface="Cambria Math" panose="02040503050406030204" pitchFamily="18" charset="0"/>
+                              <a:ea typeface="Cambria Math" panose="02040503050406030204" pitchFamily="18" charset="0"/>
+                            </a:rPr>
+                            <m:t>,</m:t>
+                          </m:r>
+                          <m:r>
+                            <a:rPr lang="en-US" sz="3200" b="0" i="1" smtClean="0">
+                              <a:latin typeface="Cambria Math" panose="02040503050406030204" pitchFamily="18" charset="0"/>
+                              <a:ea typeface="Cambria Math" panose="02040503050406030204" pitchFamily="18" charset="0"/>
+                            </a:rPr>
+                            <m:t>𝑦</m:t>
+                          </m:r>
+                          <m:r>
+                            <a:rPr lang="en-US" sz="3200" b="0" i="1" smtClean="0">
+                              <a:latin typeface="Cambria Math" panose="02040503050406030204" pitchFamily="18" charset="0"/>
+                              <a:ea typeface="Cambria Math" panose="02040503050406030204" pitchFamily="18" charset="0"/>
+                            </a:rPr>
+                            <m:t>)</m:t>
+                          </m:r>
+                        </m:e>
+                      </m:nary>
+                      <m:r>
+                        <a:rPr lang="en-US" sz="3200" b="0" i="1" smtClean="0">
+                          <a:latin typeface="Cambria Math" panose="02040503050406030204" pitchFamily="18" charset="0"/>
+                          <a:ea typeface="Cambria Math" panose="02040503050406030204" pitchFamily="18" charset="0"/>
+                        </a:rPr>
+                        <m:t>𝑑𝑠</m:t>
+                      </m:r>
+                    </m:oMath>
+                  </m:oMathPara>
+                </a14:m>
+                <a:endParaRPr lang="en-US" sz="3200" dirty="0"/>
+              </a:p>
+            </p:txBody>
+          </p:sp>
+        </mc:Choice>
+        <mc:Fallback xmlns="">
+          <p:sp>
+            <p:nvSpPr>
+              <p:cNvPr id="12" name="TextBox 11">
+                <a:extLst>
+                  <a:ext uri="{FF2B5EF4-FFF2-40B4-BE49-F238E27FC236}">
+                    <a16:creationId xmlns:a16="http://schemas.microsoft.com/office/drawing/2014/main" id="{193B745B-79B2-4957-BC4A-FACBF34152E5}"/>
+                  </a:ext>
+                </a:extLst>
+              </p:cNvPr>
+              <p:cNvSpPr txBox="1">
+                <a:spLocks noRot="1" noChangeAspect="1" noMove="1" noResize="1" noEditPoints="1" noAdjustHandles="1" noChangeArrowheads="1" noChangeShapeType="1" noTextEdit="1"/>
+              </p:cNvSpPr>
+              <p:nvPr/>
+            </p:nvSpPr>
+            <p:spPr>
+              <a:xfrm>
+                <a:off x="19431000" y="5410200"/>
+                <a:ext cx="5852884" cy="1104148"/>
+              </a:xfrm>
+              <a:prstGeom prst="rect">
+                <a:avLst/>
+              </a:prstGeom>
+              <a:blipFill>
+                <a:blip r:embed="rId5"/>
+                <a:stretch>
+                  <a:fillRect/>
+                </a:stretch>
+              </a:blipFill>
+            </p:spPr>
+            <p:txBody>
+              <a:bodyPr/>
+              <a:lstStyle/>
+              <a:p>
+                <a:r>
+                  <a:rPr lang="en-US">
+                    <a:noFill/>
+                  </a:rPr>
+                  <a:t> </a:t>
+                </a:r>
+              </a:p>
+            </p:txBody>
+          </p:sp>
+        </mc:Fallback>
+      </mc:AlternateContent>
+      <p:pic>
+        <p:nvPicPr>
+          <p:cNvPr id="14" name="Picture 13">
+            <a:extLst>
+              <a:ext uri="{FF2B5EF4-FFF2-40B4-BE49-F238E27FC236}">
+                <a16:creationId xmlns:a16="http://schemas.microsoft.com/office/drawing/2014/main" id="{8CDB4034-8CE0-4455-939B-8052976C9E04}"/>
+              </a:ext>
+            </a:extLst>
+          </p:cNvPr>
+          <p:cNvPicPr>
+            <a:picLocks noChangeAspect="1"/>
+          </p:cNvPicPr>
+          <p:nvPr/>
+        </p:nvPicPr>
+        <p:blipFill rotWithShape="1">
+          <a:blip r:embed="rId6">
+            <a:extLst>
+              <a:ext uri="{28A0092B-C50C-407E-A947-70E740481C1C}">
+                <a14:useLocalDpi xmlns:a14="http://schemas.microsoft.com/office/drawing/2010/main" val="0"/>
+              </a:ext>
+            </a:extLst>
+          </a:blip>
+          <a:srcRect l="13996" t="4280" r="15710"/>
+          <a:stretch/>
+        </p:blipFill>
+        <p:spPr>
+          <a:xfrm>
+            <a:off x="19431000" y="6555608"/>
+            <a:ext cx="2359013" cy="2409200"/>
+          </a:xfrm>
+          <a:prstGeom prst="rect">
+            <a:avLst/>
+          </a:prstGeom>
+        </p:spPr>
+      </p:pic>
+      <p:pic>
+        <p:nvPicPr>
+          <p:cNvPr id="16" name="Picture 15">
+            <a:extLst>
+              <a:ext uri="{FF2B5EF4-FFF2-40B4-BE49-F238E27FC236}">
+                <a16:creationId xmlns:a16="http://schemas.microsoft.com/office/drawing/2014/main" id="{191C8303-B7F1-40A1-9441-34ECDA12F015}"/>
+              </a:ext>
+            </a:extLst>
+          </p:cNvPr>
+          <p:cNvPicPr>
+            <a:picLocks noChangeAspect="1"/>
+          </p:cNvPicPr>
+          <p:nvPr/>
+        </p:nvPicPr>
+        <p:blipFill rotWithShape="1">
+          <a:blip r:embed="rId7">
+            <a:extLst>
+              <a:ext uri="{28A0092B-C50C-407E-A947-70E740481C1C}">
+                <a14:useLocalDpi xmlns:a14="http://schemas.microsoft.com/office/drawing/2010/main" val="0"/>
+              </a:ext>
+            </a:extLst>
+          </a:blip>
+          <a:srcRect l="3137" t="2756" r="2566" b="3518"/>
+          <a:stretch/>
+        </p:blipFill>
+        <p:spPr>
+          <a:xfrm>
+            <a:off x="22121236" y="6553200"/>
+            <a:ext cx="3238314" cy="2414016"/>
+          </a:xfrm>
+          <a:prstGeom prst="rect">
+            <a:avLst/>
+          </a:prstGeom>
+        </p:spPr>
+      </p:pic>
+      <p:sp>
+        <p:nvSpPr>
+          <p:cNvPr id="42" name="Arrow: Down 41">
+            <a:extLst>
+              <a:ext uri="{FF2B5EF4-FFF2-40B4-BE49-F238E27FC236}">
+                <a16:creationId xmlns:a16="http://schemas.microsoft.com/office/drawing/2014/main" id="{AB4F9355-2938-44DD-9EA2-2033AA3DB840}"/>
+              </a:ext>
+            </a:extLst>
+          </p:cNvPr>
+          <p:cNvSpPr/>
+          <p:nvPr/>
+        </p:nvSpPr>
+        <p:spPr>
+          <a:xfrm rot="16200000">
+            <a:off x="21854160" y="7645908"/>
+            <a:ext cx="304800" cy="228600"/>
+          </a:xfrm>
+          <a:prstGeom prst="downArrow">
+            <a:avLst/>
+          </a:prstGeom>
+          <a:solidFill>
+            <a:srgbClr val="8C1515"/>
+          </a:solidFill>
+          <a:ln>
+            <a:solidFill>
+              <a:srgbClr val="8C1515"/>
+            </a:solidFill>
+          </a:ln>
+        </p:spPr>
+        <p:style>
+          <a:lnRef idx="2">
+            <a:schemeClr val="accent1">
+              <a:shade val="50000"/>
+            </a:schemeClr>
+          </a:lnRef>
+          <a:fillRef idx="1">
+            <a:schemeClr val="accent1"/>
+          </a:fillRef>
+          <a:effectRef idx="0">
+            <a:schemeClr val="accent1"/>
+          </a:effectRef>
+          <a:fontRef idx="minor">
+            <a:schemeClr val="lt1"/>
+          </a:fontRef>
+        </p:style>
+        <p:txBody>
+          <a:bodyPr rtlCol="0" anchor="ctr"/>
+          <a:lstStyle/>
+          <a:p>
+            <a:pPr algn="ctr"/>
+            <a:endParaRPr lang="en-US"/>
+          </a:p>
+        </p:txBody>
+      </p:sp>
+      <p:sp>
+        <p:nvSpPr>
+          <p:cNvPr id="43" name="TextBox 42">
+            <a:extLst>
+              <a:ext uri="{FF2B5EF4-FFF2-40B4-BE49-F238E27FC236}">
+                <a16:creationId xmlns:a16="http://schemas.microsoft.com/office/drawing/2014/main" id="{F7CFCA48-B204-43B9-BC96-499B2C3AD53B}"/>
+              </a:ext>
+            </a:extLst>
+          </p:cNvPr>
+          <p:cNvSpPr txBox="1"/>
+          <p:nvPr/>
+        </p:nvSpPr>
+        <p:spPr>
+          <a:xfrm>
+            <a:off x="26486706" y="18637984"/>
+            <a:ext cx="5822094" cy="2862322"/>
+          </a:xfrm>
+          <a:prstGeom prst="rect">
+            <a:avLst/>
+          </a:prstGeom>
+          <a:noFill/>
+        </p:spPr>
+        <p:txBody>
+          <a:bodyPr wrap="square" rtlCol="0">
+            <a:spAutoFit/>
+          </a:bodyPr>
+          <a:lstStyle/>
+          <a:p>
+            <a:r>
+              <a:rPr lang="en-US" sz="1800" dirty="0"/>
+              <a:t>[1]: Zhang, B., Mao, Z., Liu, W., et. al. "Geometric Reinforcement Learning for Path</a:t>
+            </a:r>
+          </a:p>
+          <a:p>
+            <a:r>
+              <a:rPr lang="en-US" sz="1800" dirty="0"/>
+              <a:t>Planning of UAVs," Journal of Intelligent and Robotic Systems, Volume 77, No. 2,</a:t>
+            </a:r>
+          </a:p>
+          <a:p>
+            <a:r>
+              <a:rPr lang="en-US" sz="1800" dirty="0"/>
+              <a:t>2015, pp 391–409.</a:t>
+            </a:r>
+          </a:p>
+          <a:p>
+            <a:r>
+              <a:rPr lang="en-US" sz="1800" dirty="0"/>
+              <a:t>[2]: Zhang, B., Mao, Z., Liu, W., et. al. "Cooperative and Geometric Learning Algorithm</a:t>
+            </a:r>
+          </a:p>
+          <a:p>
+            <a:r>
+              <a:rPr lang="en-US" sz="1800" dirty="0"/>
+              <a:t>(CGLA) for path planning of UAVs with limited information," </a:t>
+            </a:r>
+            <a:r>
+              <a:rPr lang="en-US" sz="1800" dirty="0" err="1"/>
+              <a:t>Automatica</a:t>
+            </a:r>
+            <a:r>
+              <a:rPr lang="en-US" sz="1800" dirty="0"/>
+              <a:t>, Volume</a:t>
+            </a:r>
+          </a:p>
+          <a:p>
+            <a:r>
+              <a:rPr lang="en-US" sz="1800" dirty="0"/>
+              <a:t>50, No. 3, 2014, pp 809-820.</a:t>
+            </a:r>
+          </a:p>
+        </p:txBody>
+      </p:sp>
+      <p:cxnSp>
+        <p:nvCxnSpPr>
+          <p:cNvPr id="15" name="Straight Connector 14">
+            <a:extLst>
+              <a:ext uri="{FF2B5EF4-FFF2-40B4-BE49-F238E27FC236}">
+                <a16:creationId xmlns:a16="http://schemas.microsoft.com/office/drawing/2014/main" id="{5A65002C-B921-4204-A459-BED738D138E5}"/>
+              </a:ext>
+            </a:extLst>
+          </p:cNvPr>
+          <p:cNvCxnSpPr>
+            <a:cxnSpLocks/>
+          </p:cNvCxnSpPr>
+          <p:nvPr/>
+        </p:nvCxnSpPr>
+        <p:spPr>
+          <a:xfrm>
+            <a:off x="13411200" y="11430000"/>
+            <a:ext cx="0" cy="9601200"/>
+          </a:xfrm>
+          <a:prstGeom prst="line">
+            <a:avLst/>
+          </a:prstGeom>
+          <a:ln w="28575">
+            <a:solidFill>
+              <a:srgbClr val="8C1515"/>
+            </a:solidFill>
+          </a:ln>
+        </p:spPr>
+        <p:style>
+          <a:lnRef idx="1">
+            <a:schemeClr val="accent1"/>
+          </a:lnRef>
+          <a:fillRef idx="0">
+            <a:schemeClr val="accent1"/>
+          </a:fillRef>
+          <a:effectRef idx="0">
+            <a:schemeClr val="accent1"/>
+          </a:effectRef>
+          <a:fontRef idx="minor">
+            <a:schemeClr val="tx1"/>
+          </a:fontRef>
+        </p:style>
+      </p:cxnSp>
+      <p:cxnSp>
+        <p:nvCxnSpPr>
+          <p:cNvPr id="60" name="Straight Connector 59">
+            <a:extLst>
+              <a:ext uri="{FF2B5EF4-FFF2-40B4-BE49-F238E27FC236}">
+                <a16:creationId xmlns:a16="http://schemas.microsoft.com/office/drawing/2014/main" id="{C9C0DECF-B09F-43BB-8754-F48BCAF51BAB}"/>
+              </a:ext>
+            </a:extLst>
+          </p:cNvPr>
+          <p:cNvCxnSpPr>
+            <a:cxnSpLocks/>
+          </p:cNvCxnSpPr>
+          <p:nvPr/>
+        </p:nvCxnSpPr>
+        <p:spPr>
+          <a:xfrm>
+            <a:off x="19555968" y="11475720"/>
+            <a:ext cx="0" cy="9509760"/>
+          </a:xfrm>
+          <a:prstGeom prst="line">
+            <a:avLst/>
+          </a:prstGeom>
+          <a:ln w="28575">
+            <a:solidFill>
+              <a:srgbClr val="8C1515"/>
+            </a:solidFill>
+          </a:ln>
+        </p:spPr>
+        <p:style>
+          <a:lnRef idx="1">
+            <a:schemeClr val="accent1"/>
+          </a:lnRef>
+          <a:fillRef idx="0">
+            <a:schemeClr val="accent1"/>
+          </a:fillRef>
+          <a:effectRef idx="0">
+            <a:schemeClr val="accent1"/>
+          </a:effectRef>
+          <a:fontRef idx="minor">
+            <a:schemeClr val="tx1"/>
+          </a:fontRef>
+        </p:style>
+      </p:cxnSp>
+      <p:sp>
+        <p:nvSpPr>
+          <p:cNvPr id="62" name="TextBox 61">
+            <a:extLst>
+              <a:ext uri="{FF2B5EF4-FFF2-40B4-BE49-F238E27FC236}">
+                <a16:creationId xmlns:a16="http://schemas.microsoft.com/office/drawing/2014/main" id="{9F7E9392-6A19-456C-8B8C-7B4C60077DF3}"/>
+              </a:ext>
+            </a:extLst>
+          </p:cNvPr>
+          <p:cNvSpPr txBox="1"/>
+          <p:nvPr/>
+        </p:nvSpPr>
+        <p:spPr>
+          <a:xfrm>
+            <a:off x="7391399" y="11211580"/>
+            <a:ext cx="5867395" cy="954107"/>
+          </a:xfrm>
+          <a:prstGeom prst="rect">
+            <a:avLst/>
+          </a:prstGeom>
+          <a:noFill/>
+        </p:spPr>
+        <p:txBody>
+          <a:bodyPr wrap="square" rtlCol="0">
+            <a:spAutoFit/>
+          </a:bodyPr>
+          <a:lstStyle/>
+          <a:p>
+            <a:pPr algn="ctr">
+              <a:spcAft>
+                <a:spcPts val="600"/>
+              </a:spcAft>
+            </a:pPr>
+            <a:r>
+              <a:rPr lang="en-US" sz="2800" b="1" dirty="0"/>
+              <a:t>Learning an Unknown Environment</a:t>
+            </a:r>
+          </a:p>
+        </p:txBody>
+      </p:sp>
+      <p:pic>
+        <p:nvPicPr>
+          <p:cNvPr id="19" name="Picture 18">
+            <a:extLst>
+              <a:ext uri="{FF2B5EF4-FFF2-40B4-BE49-F238E27FC236}">
+                <a16:creationId xmlns:a16="http://schemas.microsoft.com/office/drawing/2014/main" id="{BD827A07-8861-4ED7-94A6-4388C2461024}"/>
+              </a:ext>
+            </a:extLst>
+          </p:cNvPr>
+          <p:cNvPicPr>
+            <a:picLocks noChangeAspect="1"/>
+          </p:cNvPicPr>
+          <p:nvPr/>
+        </p:nvPicPr>
+        <p:blipFill rotWithShape="1">
+          <a:blip r:embed="rId8">
+            <a:extLst>
+              <a:ext uri="{28A0092B-C50C-407E-A947-70E740481C1C}">
+                <a14:useLocalDpi xmlns:a14="http://schemas.microsoft.com/office/drawing/2010/main" val="0"/>
+              </a:ext>
+            </a:extLst>
+          </a:blip>
+          <a:srcRect l="13424" t="4280" r="15710"/>
+          <a:stretch/>
+        </p:blipFill>
+        <p:spPr>
+          <a:xfrm>
+            <a:off x="7655308" y="13206187"/>
+            <a:ext cx="2707892" cy="2743200"/>
+          </a:xfrm>
+          <a:prstGeom prst="rect">
+            <a:avLst/>
+          </a:prstGeom>
+        </p:spPr>
+      </p:pic>
+      <p:pic>
+        <p:nvPicPr>
+          <p:cNvPr id="22" name="Picture 21">
+            <a:extLst>
+              <a:ext uri="{FF2B5EF4-FFF2-40B4-BE49-F238E27FC236}">
+                <a16:creationId xmlns:a16="http://schemas.microsoft.com/office/drawing/2014/main" id="{265248DE-4270-4071-8627-03B5577CAA10}"/>
+              </a:ext>
+            </a:extLst>
+          </p:cNvPr>
+          <p:cNvPicPr>
+            <a:picLocks noChangeAspect="1"/>
+          </p:cNvPicPr>
+          <p:nvPr/>
+        </p:nvPicPr>
+        <p:blipFill rotWithShape="1">
+          <a:blip r:embed="rId9">
+            <a:extLst>
+              <a:ext uri="{28A0092B-C50C-407E-A947-70E740481C1C}">
+                <a14:useLocalDpi xmlns:a14="http://schemas.microsoft.com/office/drawing/2010/main" val="0"/>
+              </a:ext>
+            </a:extLst>
+          </a:blip>
+          <a:srcRect l="13423" t="4280" r="14276"/>
+          <a:stretch/>
+        </p:blipFill>
+        <p:spPr>
+          <a:xfrm>
+            <a:off x="10363200" y="13206187"/>
+            <a:ext cx="2762691" cy="2743200"/>
+          </a:xfrm>
+          <a:prstGeom prst="rect">
+            <a:avLst/>
+          </a:prstGeom>
+        </p:spPr>
+      </p:pic>
+      <p:pic>
+        <p:nvPicPr>
+          <p:cNvPr id="24" name="Picture 23">
+            <a:extLst>
+              <a:ext uri="{FF2B5EF4-FFF2-40B4-BE49-F238E27FC236}">
+                <a16:creationId xmlns:a16="http://schemas.microsoft.com/office/drawing/2014/main" id="{660D2CC8-E5FD-4EDF-98C6-BD4DC86FB838}"/>
+              </a:ext>
+            </a:extLst>
+          </p:cNvPr>
+          <p:cNvPicPr>
+            <a:picLocks noChangeAspect="1"/>
+          </p:cNvPicPr>
+          <p:nvPr/>
+        </p:nvPicPr>
+        <p:blipFill rotWithShape="1">
+          <a:blip r:embed="rId10">
+            <a:extLst>
+              <a:ext uri="{28A0092B-C50C-407E-A947-70E740481C1C}">
+                <a14:useLocalDpi xmlns:a14="http://schemas.microsoft.com/office/drawing/2010/main" val="0"/>
+              </a:ext>
+            </a:extLst>
+          </a:blip>
+          <a:srcRect l="13423" t="4744" r="14276"/>
+          <a:stretch/>
+        </p:blipFill>
+        <p:spPr>
+          <a:xfrm>
+            <a:off x="7561385" y="17602200"/>
+            <a:ext cx="2776154" cy="2743200"/>
+          </a:xfrm>
+          <a:prstGeom prst="rect">
+            <a:avLst/>
+          </a:prstGeom>
+        </p:spPr>
+      </p:pic>
+      <p:pic>
+        <p:nvPicPr>
+          <p:cNvPr id="26" name="Picture 25">
+            <a:extLst>
+              <a:ext uri="{FF2B5EF4-FFF2-40B4-BE49-F238E27FC236}">
+                <a16:creationId xmlns:a16="http://schemas.microsoft.com/office/drawing/2014/main" id="{4A18AB49-9DFC-44D6-95E2-FADD38258289}"/>
+              </a:ext>
+            </a:extLst>
+          </p:cNvPr>
+          <p:cNvPicPr>
+            <a:picLocks noChangeAspect="1"/>
+          </p:cNvPicPr>
+          <p:nvPr/>
+        </p:nvPicPr>
+        <p:blipFill rotWithShape="1">
+          <a:blip r:embed="rId11">
+            <a:extLst>
+              <a:ext uri="{28A0092B-C50C-407E-A947-70E740481C1C}">
+                <a14:useLocalDpi xmlns:a14="http://schemas.microsoft.com/office/drawing/2010/main" val="0"/>
+              </a:ext>
+            </a:extLst>
+          </a:blip>
+          <a:srcRect l="13996" t="4903" r="15139"/>
+          <a:stretch/>
+        </p:blipFill>
+        <p:spPr>
+          <a:xfrm>
+            <a:off x="10380785" y="17589500"/>
+            <a:ext cx="2725615" cy="2743200"/>
+          </a:xfrm>
+          <a:prstGeom prst="rect">
+            <a:avLst/>
+          </a:prstGeom>
+        </p:spPr>
+      </p:pic>
+      <p:sp>
+        <p:nvSpPr>
+          <p:cNvPr id="63" name="TextBox 62">
+            <a:extLst>
+              <a:ext uri="{FF2B5EF4-FFF2-40B4-BE49-F238E27FC236}">
+                <a16:creationId xmlns:a16="http://schemas.microsoft.com/office/drawing/2014/main" id="{3B96B831-EAC2-4E77-B47E-DB3BDDD44C3C}"/>
+              </a:ext>
+            </a:extLst>
+          </p:cNvPr>
+          <p:cNvSpPr txBox="1"/>
+          <p:nvPr/>
+        </p:nvSpPr>
+        <p:spPr>
+          <a:xfrm>
+            <a:off x="7391400" y="12178947"/>
+            <a:ext cx="5867395" cy="954107"/>
+          </a:xfrm>
+          <a:prstGeom prst="rect">
+            <a:avLst/>
+          </a:prstGeom>
+          <a:noFill/>
+        </p:spPr>
+        <p:txBody>
+          <a:bodyPr wrap="square" rtlCol="0">
+            <a:spAutoFit/>
+          </a:bodyPr>
+          <a:lstStyle/>
+          <a:p>
+            <a:pPr>
+              <a:spcAft>
+                <a:spcPts val="600"/>
+              </a:spcAft>
+            </a:pPr>
+            <a:r>
+              <a:rPr lang="en-US" sz="2800" dirty="0"/>
+              <a:t>The environment is initialized with a group of unseen threats </a:t>
+            </a:r>
+          </a:p>
+        </p:txBody>
+      </p:sp>
+      <p:sp>
+        <p:nvSpPr>
+          <p:cNvPr id="64" name="TextBox 63">
+            <a:extLst>
+              <a:ext uri="{FF2B5EF4-FFF2-40B4-BE49-F238E27FC236}">
+                <a16:creationId xmlns:a16="http://schemas.microsoft.com/office/drawing/2014/main" id="{7A35AC6A-B414-4A1C-8EC6-7565C63E20D2}"/>
+              </a:ext>
+            </a:extLst>
+          </p:cNvPr>
+          <p:cNvSpPr txBox="1"/>
+          <p:nvPr/>
+        </p:nvSpPr>
+        <p:spPr>
+          <a:xfrm>
+            <a:off x="7391400" y="15988605"/>
+            <a:ext cx="5867395" cy="1384995"/>
+          </a:xfrm>
+          <a:prstGeom prst="rect">
+            <a:avLst/>
+          </a:prstGeom>
+          <a:noFill/>
+        </p:spPr>
+        <p:txBody>
+          <a:bodyPr wrap="square" rtlCol="0">
+            <a:spAutoFit/>
+          </a:bodyPr>
+          <a:lstStyle/>
+          <a:p>
+            <a:pPr>
+              <a:spcAft>
+                <a:spcPts val="600"/>
+              </a:spcAft>
+            </a:pPr>
+            <a:r>
+              <a:rPr lang="en-US" sz="2800" dirty="0"/>
+              <a:t>CGLA is iteratively executed to update the path as the agent encounters unseen threats</a:t>
+            </a:r>
+          </a:p>
+        </p:txBody>
+      </p:sp>
+      <p:sp>
+        <p:nvSpPr>
+          <p:cNvPr id="8" name="TextBox 7">
+            <a:extLst>
+              <a:ext uri="{FF2B5EF4-FFF2-40B4-BE49-F238E27FC236}">
+                <a16:creationId xmlns:a16="http://schemas.microsoft.com/office/drawing/2014/main" id="{4A20AB0C-579F-4D2E-B0BB-620AB2C4D23E}"/>
+              </a:ext>
+            </a:extLst>
+          </p:cNvPr>
+          <p:cNvSpPr txBox="1"/>
+          <p:nvPr/>
+        </p:nvSpPr>
+        <p:spPr>
+          <a:xfrm>
+            <a:off x="548481" y="5512023"/>
+            <a:ext cx="5943600" cy="4616648"/>
+          </a:xfrm>
+          <a:prstGeom prst="rect">
+            <a:avLst/>
+          </a:prstGeom>
+          <a:noFill/>
+        </p:spPr>
+        <p:txBody>
+          <a:bodyPr wrap="square" rtlCol="0">
+            <a:spAutoFit/>
+          </a:bodyPr>
+          <a:lstStyle/>
+          <a:p>
+            <a:r>
+              <a:rPr lang="en-US" sz="2800" dirty="0"/>
+              <a:t>Proliferation of low cost UAVs allows them to explore more dangerous environments. Novel path planning algorithms are needed to control these UAVs.</a:t>
+            </a:r>
+          </a:p>
+          <a:p>
+            <a:endParaRPr lang="en-US" sz="1400" dirty="0"/>
+          </a:p>
+          <a:p>
+            <a:r>
+              <a:rPr lang="en-US" sz="2800" b="1" dirty="0"/>
+              <a:t>Problems</a:t>
+            </a:r>
+            <a:r>
+              <a:rPr lang="en-US" sz="2800" dirty="0"/>
+              <a:t>: </a:t>
+            </a:r>
+          </a:p>
+          <a:p>
+            <a:pPr marL="457200" indent="-457200">
+              <a:buFont typeface="Arial" panose="020B0604020202020204" pitchFamily="34" charset="0"/>
+              <a:buChar char="•"/>
+            </a:pPr>
+            <a:r>
+              <a:rPr lang="en-US" sz="2800" dirty="0"/>
+              <a:t>Unknown risk environment</a:t>
+            </a:r>
+          </a:p>
+          <a:p>
+            <a:pPr marL="457200" indent="-457200">
+              <a:buFont typeface="Arial" panose="020B0604020202020204" pitchFamily="34" charset="0"/>
+              <a:buChar char="•"/>
+            </a:pPr>
+            <a:r>
+              <a:rPr lang="en-US" sz="2800" dirty="0"/>
+              <a:t>Real time planning</a:t>
+            </a:r>
+          </a:p>
+          <a:p>
+            <a:pPr marL="457200" indent="-457200">
+              <a:buFont typeface="Arial" panose="020B0604020202020204" pitchFamily="34" charset="0"/>
+              <a:buChar char="•"/>
+            </a:pPr>
+            <a:r>
+              <a:rPr lang="en-US" sz="2800" dirty="0"/>
+              <a:t>Multiple cooperative agents</a:t>
+            </a:r>
+          </a:p>
+          <a:p>
+            <a:pPr marL="457200" indent="-457200">
+              <a:buFont typeface="Arial" panose="020B0604020202020204" pitchFamily="34" charset="0"/>
+              <a:buChar char="•"/>
+            </a:pPr>
+            <a:r>
+              <a:rPr lang="en-US" sz="2800" dirty="0"/>
+              <a:t>Multiple targets</a:t>
+            </a:r>
+          </a:p>
+        </p:txBody>
+      </p:sp>
+      <p:pic>
+        <p:nvPicPr>
+          <p:cNvPr id="13" name="Picture 12">
+            <a:extLst>
+              <a:ext uri="{FF2B5EF4-FFF2-40B4-BE49-F238E27FC236}">
+                <a16:creationId xmlns:a16="http://schemas.microsoft.com/office/drawing/2014/main" id="{589539F1-481F-4870-83FE-89FF83A277E5}"/>
+              </a:ext>
+            </a:extLst>
+          </p:cNvPr>
+          <p:cNvPicPr>
+            <a:picLocks noChangeAspect="1"/>
+          </p:cNvPicPr>
+          <p:nvPr/>
+        </p:nvPicPr>
+        <p:blipFill>
+          <a:blip r:embed="rId12">
+            <a:extLst>
+              <a:ext uri="{28A0092B-C50C-407E-A947-70E740481C1C}">
+                <a14:useLocalDpi xmlns:a14="http://schemas.microsoft.com/office/drawing/2010/main" val="0"/>
+              </a:ext>
+            </a:extLst>
+          </a:blip>
+          <a:stretch>
+            <a:fillRect/>
+          </a:stretch>
+        </p:blipFill>
+        <p:spPr>
+          <a:xfrm>
+            <a:off x="442744" y="18718900"/>
+            <a:ext cx="2677813" cy="2845700"/>
+          </a:xfrm>
+          <a:prstGeom prst="rect">
+            <a:avLst/>
+          </a:prstGeom>
+        </p:spPr>
+      </p:pic>
+      <p:pic>
+        <p:nvPicPr>
+          <p:cNvPr id="23" name="Picture 22">
+            <a:extLst>
+              <a:ext uri="{FF2B5EF4-FFF2-40B4-BE49-F238E27FC236}">
+                <a16:creationId xmlns:a16="http://schemas.microsoft.com/office/drawing/2014/main" id="{CB91CD3B-0CE3-46B9-ADF0-0C1270D7A0D5}"/>
+              </a:ext>
+            </a:extLst>
+          </p:cNvPr>
+          <p:cNvPicPr>
+            <a:picLocks noChangeAspect="1"/>
+          </p:cNvPicPr>
+          <p:nvPr/>
+        </p:nvPicPr>
+        <p:blipFill>
+          <a:blip r:embed="rId13">
+            <a:extLst>
+              <a:ext uri="{28A0092B-C50C-407E-A947-70E740481C1C}">
+                <a14:useLocalDpi xmlns:a14="http://schemas.microsoft.com/office/drawing/2010/main" val="0"/>
+              </a:ext>
+            </a:extLst>
+          </a:blip>
+          <a:stretch>
+            <a:fillRect/>
+          </a:stretch>
+        </p:blipFill>
+        <p:spPr>
+          <a:xfrm>
+            <a:off x="411163" y="11819809"/>
+            <a:ext cx="2709394" cy="2682590"/>
+          </a:xfrm>
+          <a:prstGeom prst="rect">
+            <a:avLst/>
+          </a:prstGeom>
+        </p:spPr>
+      </p:pic>
+      <p:sp>
+        <p:nvSpPr>
+          <p:cNvPr id="9" name="TextBox 8">
+            <a:extLst>
+              <a:ext uri="{FF2B5EF4-FFF2-40B4-BE49-F238E27FC236}">
+                <a16:creationId xmlns:a16="http://schemas.microsoft.com/office/drawing/2014/main" id="{734BF2E1-E844-4C15-B94D-F660C6BE9209}"/>
+              </a:ext>
+            </a:extLst>
+          </p:cNvPr>
+          <p:cNvSpPr txBox="1"/>
+          <p:nvPr/>
+        </p:nvSpPr>
+        <p:spPr>
+          <a:xfrm>
+            <a:off x="3196755" y="12002631"/>
+            <a:ext cx="3372395" cy="2246769"/>
+          </a:xfrm>
+          <a:prstGeom prst="rect">
+            <a:avLst/>
+          </a:prstGeom>
+          <a:noFill/>
+        </p:spPr>
+        <p:txBody>
+          <a:bodyPr wrap="square" rtlCol="0">
+            <a:spAutoFit/>
+          </a:bodyPr>
+          <a:lstStyle/>
+          <a:p>
+            <a:r>
+              <a:rPr lang="en-US" sz="2800" b="1" dirty="0"/>
+              <a:t>Threats</a:t>
+            </a:r>
+            <a:r>
+              <a:rPr lang="en-US" sz="2800" dirty="0"/>
+              <a:t> such as anti-air and terrain are initially unknown to UAVs. Must be discovered.</a:t>
+            </a:r>
+          </a:p>
+        </p:txBody>
+      </p:sp>
+      <p:sp>
+        <p:nvSpPr>
+          <p:cNvPr id="17" name="TextBox 16">
+            <a:extLst>
+              <a:ext uri="{FF2B5EF4-FFF2-40B4-BE49-F238E27FC236}">
+                <a16:creationId xmlns:a16="http://schemas.microsoft.com/office/drawing/2014/main" id="{EA863062-2A17-422A-85F8-1E764AAEA27B}"/>
+              </a:ext>
+            </a:extLst>
+          </p:cNvPr>
+          <p:cNvSpPr txBox="1"/>
+          <p:nvPr/>
+        </p:nvSpPr>
+        <p:spPr>
+          <a:xfrm>
+            <a:off x="3352800" y="18821400"/>
+            <a:ext cx="3077900" cy="2677656"/>
+          </a:xfrm>
+          <a:prstGeom prst="rect">
+            <a:avLst/>
+          </a:prstGeom>
+          <a:noFill/>
+        </p:spPr>
+        <p:txBody>
+          <a:bodyPr wrap="square" rtlCol="0">
+            <a:spAutoFit/>
+          </a:bodyPr>
+          <a:lstStyle/>
+          <a:p>
+            <a:r>
+              <a:rPr lang="en-US" sz="2800" b="1" dirty="0"/>
+              <a:t>UAVs</a:t>
+            </a:r>
+            <a:r>
+              <a:rPr lang="en-US" sz="2800" dirty="0"/>
+              <a:t> have realistic observation radii and fuel capacity. UAVs can share threat information.</a:t>
+            </a:r>
+            <a:endParaRPr lang="en-US" sz="2800" b="1" dirty="0"/>
+          </a:p>
+        </p:txBody>
+      </p:sp>
+      <p:sp>
+        <p:nvSpPr>
+          <p:cNvPr id="28" name="TextBox 27">
+            <a:extLst>
+              <a:ext uri="{FF2B5EF4-FFF2-40B4-BE49-F238E27FC236}">
+                <a16:creationId xmlns:a16="http://schemas.microsoft.com/office/drawing/2014/main" id="{1B7C6C1D-CE83-43ED-B891-3B805148072C}"/>
+              </a:ext>
+            </a:extLst>
+          </p:cNvPr>
+          <p:cNvSpPr txBox="1"/>
+          <p:nvPr/>
+        </p:nvSpPr>
+        <p:spPr>
+          <a:xfrm>
+            <a:off x="522587" y="14782800"/>
+            <a:ext cx="2677813" cy="3539430"/>
+          </a:xfrm>
+          <a:prstGeom prst="rect">
+            <a:avLst/>
+          </a:prstGeom>
+          <a:noFill/>
+        </p:spPr>
+        <p:txBody>
+          <a:bodyPr wrap="square" rtlCol="0">
+            <a:spAutoFit/>
+          </a:bodyPr>
+          <a:lstStyle/>
+          <a:p>
+            <a:r>
+              <a:rPr lang="en-US" sz="2800" b="1" dirty="0"/>
+              <a:t>Targets</a:t>
+            </a:r>
+            <a:r>
+              <a:rPr lang="en-US" sz="2800" dirty="0"/>
+              <a:t> are initially known to UAVs. Scenario runs until UAVs have visited all targets or run out of fuel.</a:t>
+            </a:r>
+            <a:endParaRPr lang="en-US" sz="2800" b="1" dirty="0"/>
+          </a:p>
+        </p:txBody>
+      </p:sp>
+      <p:sp>
+        <p:nvSpPr>
+          <p:cNvPr id="59" name="TextBox 58">
+            <a:extLst>
+              <a:ext uri="{FF2B5EF4-FFF2-40B4-BE49-F238E27FC236}">
+                <a16:creationId xmlns:a16="http://schemas.microsoft.com/office/drawing/2014/main" id="{CE7FD332-9751-4A37-AC49-D4CF7F46483D}"/>
+              </a:ext>
+            </a:extLst>
+          </p:cNvPr>
+          <p:cNvSpPr txBox="1"/>
+          <p:nvPr/>
+        </p:nvSpPr>
+        <p:spPr>
+          <a:xfrm>
+            <a:off x="19470384" y="11211579"/>
+            <a:ext cx="5867395" cy="1031051"/>
+          </a:xfrm>
+          <a:prstGeom prst="rect">
+            <a:avLst/>
+          </a:prstGeom>
+          <a:noFill/>
+        </p:spPr>
+        <p:txBody>
+          <a:bodyPr wrap="square" rtlCol="0">
+            <a:spAutoFit/>
+          </a:bodyPr>
+          <a:lstStyle/>
+          <a:p>
+            <a:pPr algn="ctr">
+              <a:spcAft>
+                <a:spcPts val="600"/>
+              </a:spcAft>
+            </a:pPr>
+            <a:r>
+              <a:rPr lang="en-US" sz="2800" b="1" dirty="0"/>
+              <a:t>Multiple Target – Multiple UAV</a:t>
+            </a:r>
+          </a:p>
+          <a:p>
+            <a:pPr algn="ctr">
+              <a:spcAft>
+                <a:spcPts val="600"/>
+              </a:spcAft>
+            </a:pPr>
+            <a:r>
+              <a:rPr lang="en-US" sz="2800" b="1" dirty="0"/>
+              <a:t>Environment</a:t>
+            </a:r>
+          </a:p>
+        </p:txBody>
+      </p:sp>
+      <p:sp>
+        <p:nvSpPr>
+          <p:cNvPr id="30" name="TextBox 29">
+            <a:extLst>
+              <a:ext uri="{FF2B5EF4-FFF2-40B4-BE49-F238E27FC236}">
+                <a16:creationId xmlns:a16="http://schemas.microsoft.com/office/drawing/2014/main" id="{0B5A14F4-B944-4123-84BD-42F0E38EA9D6}"/>
+              </a:ext>
+            </a:extLst>
+          </p:cNvPr>
+          <p:cNvSpPr txBox="1"/>
+          <p:nvPr/>
+        </p:nvSpPr>
+        <p:spPr>
+          <a:xfrm>
+            <a:off x="19998677" y="12394390"/>
+            <a:ext cx="4953000" cy="523220"/>
+          </a:xfrm>
+          <a:prstGeom prst="rect">
+            <a:avLst/>
+          </a:prstGeom>
+          <a:noFill/>
+        </p:spPr>
+        <p:txBody>
+          <a:bodyPr wrap="square" rtlCol="0">
+            <a:spAutoFit/>
+          </a:bodyPr>
+          <a:lstStyle/>
+          <a:p>
+            <a:r>
+              <a:rPr lang="en-US" sz="2800" dirty="0"/>
+              <a:t>Scenario with </a:t>
+            </a:r>
+            <a:r>
+              <a:rPr lang="en-US" sz="2800"/>
+              <a:t>only one </a:t>
+            </a:r>
+            <a:r>
+              <a:rPr lang="en-US" sz="2800" dirty="0"/>
+              <a:t>UAV</a:t>
+            </a:r>
+          </a:p>
+        </p:txBody>
+      </p:sp>
+      <p:sp>
+        <p:nvSpPr>
+          <p:cNvPr id="31" name="TextBox 30">
+            <a:extLst>
+              <a:ext uri="{FF2B5EF4-FFF2-40B4-BE49-F238E27FC236}">
+                <a16:creationId xmlns:a16="http://schemas.microsoft.com/office/drawing/2014/main" id="{CDAB2314-E66C-4053-AB0E-B3D68D293884}"/>
+              </a:ext>
+            </a:extLst>
+          </p:cNvPr>
+          <p:cNvSpPr txBox="1"/>
+          <p:nvPr/>
+        </p:nvSpPr>
+        <p:spPr>
+          <a:xfrm>
+            <a:off x="19998677" y="15949387"/>
+            <a:ext cx="5285207" cy="1384995"/>
+          </a:xfrm>
+          <a:prstGeom prst="rect">
+            <a:avLst/>
+          </a:prstGeom>
+          <a:noFill/>
+        </p:spPr>
+        <p:txBody>
+          <a:bodyPr wrap="square" rtlCol="0">
+            <a:spAutoFit/>
+          </a:bodyPr>
+          <a:lstStyle/>
+          <a:p>
+            <a:r>
+              <a:rPr lang="en-US" sz="2800" dirty="0"/>
+              <a:t>Efficient target assignment speeds up the target observation with multiple UAVs</a:t>
+            </a:r>
+          </a:p>
+        </p:txBody>
+      </p:sp>
+      <p:sp>
+        <p:nvSpPr>
+          <p:cNvPr id="65" name="TextBox 64">
+            <a:extLst>
+              <a:ext uri="{FF2B5EF4-FFF2-40B4-BE49-F238E27FC236}">
+                <a16:creationId xmlns:a16="http://schemas.microsoft.com/office/drawing/2014/main" id="{FC4D6B0D-AF38-4D6B-9304-CB736FD0439E}"/>
+              </a:ext>
+            </a:extLst>
+          </p:cNvPr>
+          <p:cNvSpPr txBox="1"/>
+          <p:nvPr/>
+        </p:nvSpPr>
+        <p:spPr>
+          <a:xfrm>
+            <a:off x="13335002" y="11224840"/>
+            <a:ext cx="5867395" cy="954107"/>
+          </a:xfrm>
+          <a:prstGeom prst="rect">
+            <a:avLst/>
+          </a:prstGeom>
+          <a:noFill/>
+        </p:spPr>
+        <p:txBody>
+          <a:bodyPr wrap="square" rtlCol="0">
+            <a:spAutoFit/>
+          </a:bodyPr>
+          <a:lstStyle/>
+          <a:p>
+            <a:pPr algn="ctr">
+              <a:spcAft>
+                <a:spcPts val="600"/>
+              </a:spcAft>
+            </a:pPr>
+            <a:r>
+              <a:rPr lang="en-US" sz="2800" b="1" dirty="0"/>
+              <a:t>Information Sharing in an Unknown Environment</a:t>
+            </a:r>
+          </a:p>
+        </p:txBody>
+      </p:sp>
+      <p:sp>
+        <p:nvSpPr>
+          <p:cNvPr id="36" name="TextBox 35">
+            <a:extLst>
+              <a:ext uri="{FF2B5EF4-FFF2-40B4-BE49-F238E27FC236}">
+                <a16:creationId xmlns:a16="http://schemas.microsoft.com/office/drawing/2014/main" id="{C3A26004-81DF-44EA-8526-836BB1A6378F}"/>
+              </a:ext>
+            </a:extLst>
+          </p:cNvPr>
+          <p:cNvSpPr txBox="1"/>
+          <p:nvPr/>
+        </p:nvSpPr>
+        <p:spPr>
+          <a:xfrm>
+            <a:off x="13868400" y="12178947"/>
+            <a:ext cx="5333997" cy="954107"/>
+          </a:xfrm>
+          <a:prstGeom prst="rect">
+            <a:avLst/>
+          </a:prstGeom>
+          <a:noFill/>
+        </p:spPr>
+        <p:txBody>
+          <a:bodyPr wrap="square" rtlCol="0">
+            <a:spAutoFit/>
+          </a:bodyPr>
+          <a:lstStyle/>
+          <a:p>
+            <a:r>
+              <a:rPr lang="en-US" sz="2800" dirty="0"/>
+              <a:t>Scenario with one UAV must discover all threats</a:t>
+            </a:r>
+          </a:p>
+        </p:txBody>
+      </p:sp>
+      <p:sp>
+        <p:nvSpPr>
+          <p:cNvPr id="39" name="TextBox 38">
+            <a:extLst>
+              <a:ext uri="{FF2B5EF4-FFF2-40B4-BE49-F238E27FC236}">
+                <a16:creationId xmlns:a16="http://schemas.microsoft.com/office/drawing/2014/main" id="{44B26FD4-2852-4FAC-91E5-B2A06FF9D2FC}"/>
+              </a:ext>
+            </a:extLst>
+          </p:cNvPr>
+          <p:cNvSpPr txBox="1"/>
+          <p:nvPr/>
+        </p:nvSpPr>
+        <p:spPr>
+          <a:xfrm>
+            <a:off x="13764772" y="16177144"/>
+            <a:ext cx="5505887" cy="1384995"/>
+          </a:xfrm>
+          <a:prstGeom prst="rect">
+            <a:avLst/>
+          </a:prstGeom>
+          <a:noFill/>
+        </p:spPr>
+        <p:txBody>
+          <a:bodyPr wrap="square" rtlCol="0">
+            <a:spAutoFit/>
+          </a:bodyPr>
+          <a:lstStyle/>
+          <a:p>
+            <a:r>
+              <a:rPr lang="en-US" sz="2800" dirty="0"/>
+              <a:t>UAVs share risk information as it’s discovered, speeding up target observation</a:t>
+            </a:r>
+          </a:p>
+        </p:txBody>
+      </p:sp>
+      <p:pic>
+        <p:nvPicPr>
+          <p:cNvPr id="61" name="Picture 60">
+            <a:extLst>
+              <a:ext uri="{FF2B5EF4-FFF2-40B4-BE49-F238E27FC236}">
+                <a16:creationId xmlns:a16="http://schemas.microsoft.com/office/drawing/2014/main" id="{4C32BC76-8313-4E5E-B0A1-9CE31654A7D4}"/>
+              </a:ext>
+            </a:extLst>
+          </p:cNvPr>
+          <p:cNvPicPr>
+            <a:picLocks noChangeAspect="1"/>
+          </p:cNvPicPr>
+          <p:nvPr/>
+        </p:nvPicPr>
+        <p:blipFill>
+          <a:blip r:embed="rId14">
+            <a:extLst>
+              <a:ext uri="{28A0092B-C50C-407E-A947-70E740481C1C}">
+                <a14:useLocalDpi xmlns:a14="http://schemas.microsoft.com/office/drawing/2010/main" val="0"/>
+              </a:ext>
+            </a:extLst>
+          </a:blip>
+          <a:stretch>
+            <a:fillRect/>
+          </a:stretch>
+        </p:blipFill>
+        <p:spPr>
+          <a:xfrm>
+            <a:off x="3120557" y="14502399"/>
+            <a:ext cx="3505379" cy="4216501"/>
+          </a:xfrm>
+          <a:prstGeom prst="rect">
+            <a:avLst/>
+          </a:prstGeom>
+        </p:spPr>
+      </p:pic>
+    </p:spTree>
+    <p:extLst>
+      <p:ext uri="{BB962C8B-B14F-4D97-AF65-F5344CB8AC3E}">
+        <p14:creationId xmlns:p14="http://schemas.microsoft.com/office/powerpoint/2010/main" val="1740976991"/>
+      </p:ext>
+    </p:extLst>
+  </p:cSld>
+  <p:clrMapOvr>
+    <a:masterClrMapping/>
+  </p:clrMapOvr>
+</p:sld>
+</file>
+
+<file path=ppt/slides/slide3.xml><?xml version="1.0" encoding="utf-8"?>
+<p:sld xmlns:a="http://schemas.openxmlformats.org/drawingml/2006/main" xmlns:r="http://schemas.openxmlformats.org/officeDocument/2006/relationships" xmlns:p="http://schemas.openxmlformats.org/presentationml/2006/main">
+  <p:cSld>
+    <p:spTree>
+      <p:nvGrpSpPr>
+        <p:cNvPr id="1" name=""/>
+        <p:cNvGrpSpPr/>
+        <p:nvPr/>
+      </p:nvGrpSpPr>
+      <p:grpSpPr>
+        <a:xfrm>
+          <a:off x="0" y="0"/>
+          <a:ext cx="0" cy="0"/>
+          <a:chOff x="0" y="0"/>
+          <a:chExt cx="0" cy="0"/>
+        </a:xfrm>
+      </p:grpSpPr>
+      <p:sp>
+        <p:nvSpPr>
+          <p:cNvPr id="2" name="Title 1">
+            <a:extLst>
+              <a:ext uri="{FF2B5EF4-FFF2-40B4-BE49-F238E27FC236}">
+                <a16:creationId xmlns:a16="http://schemas.microsoft.com/office/drawing/2014/main" id="{2ADA9D23-909F-45C1-85C8-080B4A437944}"/>
+              </a:ext>
+            </a:extLst>
+          </p:cNvPr>
+          <p:cNvSpPr>
+            <a:spLocks noGrp="1"/>
+          </p:cNvSpPr>
+          <p:nvPr>
+            <p:ph type="title"/>
+          </p:nvPr>
+        </p:nvSpPr>
+        <p:spPr/>
+        <p:txBody>
+          <a:bodyPr/>
+          <a:lstStyle/>
+          <a:p>
+            <a:endParaRPr lang="en-US"/>
+          </a:p>
+        </p:txBody>
+      </p:sp>
+      <p:sp>
+        <p:nvSpPr>
+          <p:cNvPr id="3" name="Content Placeholder 2">
+            <a:extLst>
+              <a:ext uri="{FF2B5EF4-FFF2-40B4-BE49-F238E27FC236}">
+                <a16:creationId xmlns:a16="http://schemas.microsoft.com/office/drawing/2014/main" id="{2C48D5AF-E85F-4536-BA6C-B68AD0565C9B}"/>
+              </a:ext>
+            </a:extLst>
+          </p:cNvPr>
+          <p:cNvSpPr>
+            <a:spLocks noGrp="1"/>
+          </p:cNvSpPr>
+          <p:nvPr>
+            <p:ph idx="1"/>
+          </p:nvPr>
+        </p:nvSpPr>
+        <p:spPr/>
+        <p:txBody>
+          <a:bodyPr/>
+          <a:lstStyle/>
+          <a:p>
+            <a:r>
+              <a:rPr lang="en-US" dirty="0"/>
+              <a:t>Image source - </a:t>
+            </a:r>
+            <a:r>
+              <a:rPr lang="en-US" dirty="0">
+                <a:hlinkClick r:id="rId2"/>
+              </a:rPr>
+              <a:t>https://www.uasvision.com/2017/05/22/us-air-force-research-lab-to-extend-aircraft-isr-range/</a:t>
+            </a:r>
+            <a:endParaRPr lang="en-US" dirty="0"/>
+          </a:p>
+          <a:p>
+            <a:r>
+              <a:rPr lang="en-US" dirty="0">
+                <a:hlinkClick r:id="rId3"/>
+              </a:rPr>
+              <a:t>https://www.uasvision.com/2015/10/12/anti-uav-defence-system-upgraded/</a:t>
+            </a:r>
+            <a:endParaRPr lang="en-US" dirty="0"/>
+          </a:p>
+          <a:p>
+            <a:r>
+              <a:rPr lang="en-US" dirty="0"/>
+              <a:t>https://theintercept.com/2016/01/28/hacked-images-from-israels-drone-fleet/</a:t>
+            </a:r>
+          </a:p>
+          <a:p>
+            <a:endParaRPr lang="en-US" dirty="0"/>
+          </a:p>
+        </p:txBody>
+      </p:sp>
+    </p:spTree>
+    <p:extLst>
+      <p:ext uri="{BB962C8B-B14F-4D97-AF65-F5344CB8AC3E}">
+        <p14:creationId xmlns:p14="http://schemas.microsoft.com/office/powerpoint/2010/main" val="1442027729"/>
+      </p:ext>
+    </p:extLst>
   </p:cSld>
   <p:clrMapOvr>
     <a:masterClrMapping/>

</xml_diff>